<commit_message>
Suppression élément inutile présentation
</commit_message>
<xml_diff>
--- a/Présentation.pptx
+++ b/Présentation.pptx
@@ -5,7 +5,7 @@
     <p:sldMasterId id="2147483648" r:id="rId1"/>
   </p:sldMasterIdLst>
   <p:notesMasterIdLst>
-    <p:notesMasterId r:id="rId24"/>
+    <p:notesMasterId r:id="rId20"/>
   </p:notesMasterIdLst>
   <p:sldIdLst>
     <p:sldId id="256" r:id="rId2"/>
@@ -24,12 +24,8 @@
     <p:sldId id="284" r:id="rId15"/>
     <p:sldId id="285" r:id="rId16"/>
     <p:sldId id="294" r:id="rId17"/>
-    <p:sldId id="286" r:id="rId18"/>
-    <p:sldId id="296" r:id="rId19"/>
-    <p:sldId id="290" r:id="rId20"/>
-    <p:sldId id="295" r:id="rId21"/>
-    <p:sldId id="288" r:id="rId22"/>
-    <p:sldId id="289" r:id="rId23"/>
+    <p:sldId id="288" r:id="rId18"/>
+    <p:sldId id="289" r:id="rId19"/>
   </p:sldIdLst>
   <p:sldSz cx="12192000" cy="6858000"/>
   <p:notesSz cx="6858000" cy="9144000"/>
@@ -218,7 +214,7 @@
           <a:p>
             <a:fld id="{033193B6-5E70-9947-90BB-6115D3AF2A14}" type="datetimeFigureOut">
               <a:rPr lang="fr-FR" smtClean="0"/>
-              <a:t>31/01/2024</a:t>
+              <a:t>01/02/2024</a:t>
             </a:fld>
             <a:endParaRPr lang="fr-FR"/>
           </a:p>
@@ -1539,7 +1535,7 @@
         <p:cNvPr id="1" name="">
           <a:extLst>
             <a:ext uri="{FF2B5EF4-FFF2-40B4-BE49-F238E27FC236}">
-              <a16:creationId xmlns:a16="http://schemas.microsoft.com/office/drawing/2014/main" id="{F36513F0-37D6-D747-1421-6E60B8C07C7E}"/>
+              <a16:creationId xmlns:a16="http://schemas.microsoft.com/office/drawing/2014/main" id="{010D5E84-2CE3-9548-EE69-BF923738A15C}"/>
             </a:ext>
           </a:extLst>
         </p:cNvPr>
@@ -1559,7 +1555,7 @@
           <p:cNvPr id="2" name="Espace réservé de l'image des diapositives 1">
             <a:extLst>
               <a:ext uri="{FF2B5EF4-FFF2-40B4-BE49-F238E27FC236}">
-                <a16:creationId xmlns:a16="http://schemas.microsoft.com/office/drawing/2014/main" id="{CCA557E2-1303-1B92-DE50-632EB09C87A4}"/>
+                <a16:creationId xmlns:a16="http://schemas.microsoft.com/office/drawing/2014/main" id="{817D894F-772D-5E4B-1243-8266B8DDA653}"/>
               </a:ext>
             </a:extLst>
           </p:cNvPr>
@@ -1577,7 +1573,7 @@
           <p:cNvPr id="3" name="Espace réservé des notes 2">
             <a:extLst>
               <a:ext uri="{FF2B5EF4-FFF2-40B4-BE49-F238E27FC236}">
-                <a16:creationId xmlns:a16="http://schemas.microsoft.com/office/drawing/2014/main" id="{57D81247-1186-5C36-1438-1C1DDC87D2AF}"/>
+                <a16:creationId xmlns:a16="http://schemas.microsoft.com/office/drawing/2014/main" id="{1BD83025-DB39-07F0-EA02-0EEDE356C911}"/>
               </a:ext>
             </a:extLst>
           </p:cNvPr>
@@ -1602,7 +1598,7 @@
           <p:cNvPr id="4" name="Espace réservé du numéro de diapositive 3">
             <a:extLst>
               <a:ext uri="{FF2B5EF4-FFF2-40B4-BE49-F238E27FC236}">
-                <a16:creationId xmlns:a16="http://schemas.microsoft.com/office/drawing/2014/main" id="{654513DC-AD84-18E9-2B94-9358F81DDCE2}"/>
+                <a16:creationId xmlns:a16="http://schemas.microsoft.com/office/drawing/2014/main" id="{8695B049-66C2-B44C-D3BA-30A6938FE4BC}"/>
               </a:ext>
             </a:extLst>
           </p:cNvPr>
@@ -1629,7 +1625,7 @@
     </p:spTree>
     <p:extLst>
       <p:ext uri="{BB962C8B-B14F-4D97-AF65-F5344CB8AC3E}">
-        <p14:creationId xmlns:p14="http://schemas.microsoft.com/office/powerpoint/2010/main" val="2216242843"/>
+        <p14:creationId xmlns:p14="http://schemas.microsoft.com/office/powerpoint/2010/main" val="3296688803"/>
       </p:ext>
     </p:extLst>
   </p:cSld>
@@ -1647,7 +1643,7 @@
         <p:cNvPr id="1" name="">
           <a:extLst>
             <a:ext uri="{FF2B5EF4-FFF2-40B4-BE49-F238E27FC236}">
-              <a16:creationId xmlns:a16="http://schemas.microsoft.com/office/drawing/2014/main" id="{1D0AA110-C694-038E-FE2C-CB79290D8AD2}"/>
+              <a16:creationId xmlns:a16="http://schemas.microsoft.com/office/drawing/2014/main" id="{93C11A7E-4646-B6FB-2B53-97F31F9A9C49}"/>
             </a:ext>
           </a:extLst>
         </p:cNvPr>
@@ -1667,7 +1663,7 @@
           <p:cNvPr id="2" name="Espace réservé de l'image des diapositives 1">
             <a:extLst>
               <a:ext uri="{FF2B5EF4-FFF2-40B4-BE49-F238E27FC236}">
-                <a16:creationId xmlns:a16="http://schemas.microsoft.com/office/drawing/2014/main" id="{EE96C880-036E-6F99-9222-750A987345B1}"/>
+                <a16:creationId xmlns:a16="http://schemas.microsoft.com/office/drawing/2014/main" id="{4A1AFE55-B6F8-2204-C2FB-4552E4A97831}"/>
               </a:ext>
             </a:extLst>
           </p:cNvPr>
@@ -1685,7 +1681,7 @@
           <p:cNvPr id="3" name="Espace réservé des notes 2">
             <a:extLst>
               <a:ext uri="{FF2B5EF4-FFF2-40B4-BE49-F238E27FC236}">
-                <a16:creationId xmlns:a16="http://schemas.microsoft.com/office/drawing/2014/main" id="{54D58964-6A0C-4D8E-2E03-4B99E25AB2A9}"/>
+                <a16:creationId xmlns:a16="http://schemas.microsoft.com/office/drawing/2014/main" id="{5789D098-6A73-1198-4406-45943C74189F}"/>
               </a:ext>
             </a:extLst>
           </p:cNvPr>
@@ -1710,7 +1706,7 @@
           <p:cNvPr id="4" name="Espace réservé du numéro de diapositive 3">
             <a:extLst>
               <a:ext uri="{FF2B5EF4-FFF2-40B4-BE49-F238E27FC236}">
-                <a16:creationId xmlns:a16="http://schemas.microsoft.com/office/drawing/2014/main" id="{4308DD36-8BED-02FE-60A8-C96CB32E4A4B}"/>
+                <a16:creationId xmlns:a16="http://schemas.microsoft.com/office/drawing/2014/main" id="{3A16D995-1F2F-F047-9953-519E94397D9D}"/>
               </a:ext>
             </a:extLst>
           </p:cNvPr>
@@ -1737,115 +1733,7 @@
     </p:spTree>
     <p:extLst>
       <p:ext uri="{BB962C8B-B14F-4D97-AF65-F5344CB8AC3E}">
-        <p14:creationId xmlns:p14="http://schemas.microsoft.com/office/powerpoint/2010/main" val="2875577167"/>
-      </p:ext>
-    </p:extLst>
-  </p:cSld>
-  <p:clrMapOvr>
-    <a:masterClrMapping/>
-  </p:clrMapOvr>
-</p:notes>
-</file>
-
-<file path=ppt/notesSlides/notesSlide19.xml><?xml version="1.0" encoding="utf-8"?>
-<p:notes xmlns:a="http://schemas.openxmlformats.org/drawingml/2006/main" xmlns:r="http://schemas.openxmlformats.org/officeDocument/2006/relationships" xmlns:p="http://schemas.openxmlformats.org/presentationml/2006/main">
-  <p:cSld>
-    <p:spTree>
-      <p:nvGrpSpPr>
-        <p:cNvPr id="1" name="">
-          <a:extLst>
-            <a:ext uri="{FF2B5EF4-FFF2-40B4-BE49-F238E27FC236}">
-              <a16:creationId xmlns:a16="http://schemas.microsoft.com/office/drawing/2014/main" id="{F36513F0-37D6-D747-1421-6E60B8C07C7E}"/>
-            </a:ext>
-          </a:extLst>
-        </p:cNvPr>
-        <p:cNvGrpSpPr/>
-        <p:nvPr/>
-      </p:nvGrpSpPr>
-      <p:grpSpPr>
-        <a:xfrm>
-          <a:off x="0" y="0"/>
-          <a:ext cx="0" cy="0"/>
-          <a:chOff x="0" y="0"/>
-          <a:chExt cx="0" cy="0"/>
-        </a:xfrm>
-      </p:grpSpPr>
-      <p:sp>
-        <p:nvSpPr>
-          <p:cNvPr id="2" name="Espace réservé de l'image des diapositives 1">
-            <a:extLst>
-              <a:ext uri="{FF2B5EF4-FFF2-40B4-BE49-F238E27FC236}">
-                <a16:creationId xmlns:a16="http://schemas.microsoft.com/office/drawing/2014/main" id="{CCA557E2-1303-1B92-DE50-632EB09C87A4}"/>
-              </a:ext>
-            </a:extLst>
-          </p:cNvPr>
-          <p:cNvSpPr>
-            <a:spLocks noGrp="1" noRot="1" noChangeAspect="1"/>
-          </p:cNvSpPr>
-          <p:nvPr>
-            <p:ph type="sldImg"/>
-          </p:nvPr>
-        </p:nvSpPr>
-        <p:spPr/>
-      </p:sp>
-      <p:sp>
-        <p:nvSpPr>
-          <p:cNvPr id="3" name="Espace réservé des notes 2">
-            <a:extLst>
-              <a:ext uri="{FF2B5EF4-FFF2-40B4-BE49-F238E27FC236}">
-                <a16:creationId xmlns:a16="http://schemas.microsoft.com/office/drawing/2014/main" id="{57D81247-1186-5C36-1438-1C1DDC87D2AF}"/>
-              </a:ext>
-            </a:extLst>
-          </p:cNvPr>
-          <p:cNvSpPr>
-            <a:spLocks noGrp="1"/>
-          </p:cNvSpPr>
-          <p:nvPr>
-            <p:ph type="body" idx="1"/>
-          </p:nvPr>
-        </p:nvSpPr>
-        <p:spPr/>
-        <p:txBody>
-          <a:bodyPr/>
-          <a:lstStyle/>
-          <a:p>
-            <a:endParaRPr lang="fr-FR" dirty="0"/>
-          </a:p>
-        </p:txBody>
-      </p:sp>
-      <p:sp>
-        <p:nvSpPr>
-          <p:cNvPr id="4" name="Espace réservé du numéro de diapositive 3">
-            <a:extLst>
-              <a:ext uri="{FF2B5EF4-FFF2-40B4-BE49-F238E27FC236}">
-                <a16:creationId xmlns:a16="http://schemas.microsoft.com/office/drawing/2014/main" id="{654513DC-AD84-18E9-2B94-9358F81DDCE2}"/>
-              </a:ext>
-            </a:extLst>
-          </p:cNvPr>
-          <p:cNvSpPr>
-            <a:spLocks noGrp="1"/>
-          </p:cNvSpPr>
-          <p:nvPr>
-            <p:ph type="sldNum" sz="quarter" idx="5"/>
-          </p:nvPr>
-        </p:nvSpPr>
-        <p:spPr/>
-        <p:txBody>
-          <a:bodyPr/>
-          <a:lstStyle/>
-          <a:p>
-            <a:fld id="{EB0C3375-AD00-2849-8B47-02ED823D7559}" type="slidenum">
-              <a:rPr lang="fr-FR" smtClean="0"/>
-              <a:t>19</a:t>
-            </a:fld>
-            <a:endParaRPr lang="fr-FR"/>
-          </a:p>
-        </p:txBody>
-      </p:sp>
-    </p:spTree>
-    <p:extLst>
-      <p:ext uri="{BB962C8B-B14F-4D97-AF65-F5344CB8AC3E}">
-        <p14:creationId xmlns:p14="http://schemas.microsoft.com/office/powerpoint/2010/main" val="187704489"/>
+        <p14:creationId xmlns:p14="http://schemas.microsoft.com/office/powerpoint/2010/main" val="2224721334"/>
       </p:ext>
     </p:extLst>
   </p:cSld>
@@ -1933,330 +1821,6 @@
     <p:extLst>
       <p:ext uri="{BB962C8B-B14F-4D97-AF65-F5344CB8AC3E}">
         <p14:creationId xmlns:p14="http://schemas.microsoft.com/office/powerpoint/2010/main" val="1380767728"/>
-      </p:ext>
-    </p:extLst>
-  </p:cSld>
-  <p:clrMapOvr>
-    <a:masterClrMapping/>
-  </p:clrMapOvr>
-</p:notes>
-</file>
-
-<file path=ppt/notesSlides/notesSlide20.xml><?xml version="1.0" encoding="utf-8"?>
-<p:notes xmlns:a="http://schemas.openxmlformats.org/drawingml/2006/main" xmlns:r="http://schemas.openxmlformats.org/officeDocument/2006/relationships" xmlns:p="http://schemas.openxmlformats.org/presentationml/2006/main">
-  <p:cSld>
-    <p:spTree>
-      <p:nvGrpSpPr>
-        <p:cNvPr id="1" name="">
-          <a:extLst>
-            <a:ext uri="{FF2B5EF4-FFF2-40B4-BE49-F238E27FC236}">
-              <a16:creationId xmlns:a16="http://schemas.microsoft.com/office/drawing/2014/main" id="{3B780864-11BA-9C29-ECF8-CD8A21BBDE4E}"/>
-            </a:ext>
-          </a:extLst>
-        </p:cNvPr>
-        <p:cNvGrpSpPr/>
-        <p:nvPr/>
-      </p:nvGrpSpPr>
-      <p:grpSpPr>
-        <a:xfrm>
-          <a:off x="0" y="0"/>
-          <a:ext cx="0" cy="0"/>
-          <a:chOff x="0" y="0"/>
-          <a:chExt cx="0" cy="0"/>
-        </a:xfrm>
-      </p:grpSpPr>
-      <p:sp>
-        <p:nvSpPr>
-          <p:cNvPr id="2" name="Espace réservé de l'image des diapositives 1">
-            <a:extLst>
-              <a:ext uri="{FF2B5EF4-FFF2-40B4-BE49-F238E27FC236}">
-                <a16:creationId xmlns:a16="http://schemas.microsoft.com/office/drawing/2014/main" id="{FB180D06-92E9-FC71-D74B-B472C90A58D3}"/>
-              </a:ext>
-            </a:extLst>
-          </p:cNvPr>
-          <p:cNvSpPr>
-            <a:spLocks noGrp="1" noRot="1" noChangeAspect="1"/>
-          </p:cNvSpPr>
-          <p:nvPr>
-            <p:ph type="sldImg"/>
-          </p:nvPr>
-        </p:nvSpPr>
-        <p:spPr/>
-      </p:sp>
-      <p:sp>
-        <p:nvSpPr>
-          <p:cNvPr id="3" name="Espace réservé des notes 2">
-            <a:extLst>
-              <a:ext uri="{FF2B5EF4-FFF2-40B4-BE49-F238E27FC236}">
-                <a16:creationId xmlns:a16="http://schemas.microsoft.com/office/drawing/2014/main" id="{91448EA3-4331-13DB-F626-F5E1F9AB6B0E}"/>
-              </a:ext>
-            </a:extLst>
-          </p:cNvPr>
-          <p:cNvSpPr>
-            <a:spLocks noGrp="1"/>
-          </p:cNvSpPr>
-          <p:nvPr>
-            <p:ph type="body" idx="1"/>
-          </p:nvPr>
-        </p:nvSpPr>
-        <p:spPr/>
-        <p:txBody>
-          <a:bodyPr/>
-          <a:lstStyle/>
-          <a:p>
-            <a:endParaRPr lang="fr-FR" dirty="0"/>
-          </a:p>
-        </p:txBody>
-      </p:sp>
-      <p:sp>
-        <p:nvSpPr>
-          <p:cNvPr id="4" name="Espace réservé du numéro de diapositive 3">
-            <a:extLst>
-              <a:ext uri="{FF2B5EF4-FFF2-40B4-BE49-F238E27FC236}">
-                <a16:creationId xmlns:a16="http://schemas.microsoft.com/office/drawing/2014/main" id="{EE6A5A19-6C5B-D7D0-4B4D-A661D20F24BF}"/>
-              </a:ext>
-            </a:extLst>
-          </p:cNvPr>
-          <p:cNvSpPr>
-            <a:spLocks noGrp="1"/>
-          </p:cNvSpPr>
-          <p:nvPr>
-            <p:ph type="sldNum" sz="quarter" idx="5"/>
-          </p:nvPr>
-        </p:nvSpPr>
-        <p:spPr/>
-        <p:txBody>
-          <a:bodyPr/>
-          <a:lstStyle/>
-          <a:p>
-            <a:fld id="{EB0C3375-AD00-2849-8B47-02ED823D7559}" type="slidenum">
-              <a:rPr lang="fr-FR" smtClean="0"/>
-              <a:t>20</a:t>
-            </a:fld>
-            <a:endParaRPr lang="fr-FR"/>
-          </a:p>
-        </p:txBody>
-      </p:sp>
-    </p:spTree>
-    <p:extLst>
-      <p:ext uri="{BB962C8B-B14F-4D97-AF65-F5344CB8AC3E}">
-        <p14:creationId xmlns:p14="http://schemas.microsoft.com/office/powerpoint/2010/main" val="3842465737"/>
-      </p:ext>
-    </p:extLst>
-  </p:cSld>
-  <p:clrMapOvr>
-    <a:masterClrMapping/>
-  </p:clrMapOvr>
-</p:notes>
-</file>
-
-<file path=ppt/notesSlides/notesSlide21.xml><?xml version="1.0" encoding="utf-8"?>
-<p:notes xmlns:a="http://schemas.openxmlformats.org/drawingml/2006/main" xmlns:r="http://schemas.openxmlformats.org/officeDocument/2006/relationships" xmlns:p="http://schemas.openxmlformats.org/presentationml/2006/main">
-  <p:cSld>
-    <p:spTree>
-      <p:nvGrpSpPr>
-        <p:cNvPr id="1" name="">
-          <a:extLst>
-            <a:ext uri="{FF2B5EF4-FFF2-40B4-BE49-F238E27FC236}">
-              <a16:creationId xmlns:a16="http://schemas.microsoft.com/office/drawing/2014/main" id="{010D5E84-2CE3-9548-EE69-BF923738A15C}"/>
-            </a:ext>
-          </a:extLst>
-        </p:cNvPr>
-        <p:cNvGrpSpPr/>
-        <p:nvPr/>
-      </p:nvGrpSpPr>
-      <p:grpSpPr>
-        <a:xfrm>
-          <a:off x="0" y="0"/>
-          <a:ext cx="0" cy="0"/>
-          <a:chOff x="0" y="0"/>
-          <a:chExt cx="0" cy="0"/>
-        </a:xfrm>
-      </p:grpSpPr>
-      <p:sp>
-        <p:nvSpPr>
-          <p:cNvPr id="2" name="Espace réservé de l'image des diapositives 1">
-            <a:extLst>
-              <a:ext uri="{FF2B5EF4-FFF2-40B4-BE49-F238E27FC236}">
-                <a16:creationId xmlns:a16="http://schemas.microsoft.com/office/drawing/2014/main" id="{817D894F-772D-5E4B-1243-8266B8DDA653}"/>
-              </a:ext>
-            </a:extLst>
-          </p:cNvPr>
-          <p:cNvSpPr>
-            <a:spLocks noGrp="1" noRot="1" noChangeAspect="1"/>
-          </p:cNvSpPr>
-          <p:nvPr>
-            <p:ph type="sldImg"/>
-          </p:nvPr>
-        </p:nvSpPr>
-        <p:spPr/>
-      </p:sp>
-      <p:sp>
-        <p:nvSpPr>
-          <p:cNvPr id="3" name="Espace réservé des notes 2">
-            <a:extLst>
-              <a:ext uri="{FF2B5EF4-FFF2-40B4-BE49-F238E27FC236}">
-                <a16:creationId xmlns:a16="http://schemas.microsoft.com/office/drawing/2014/main" id="{1BD83025-DB39-07F0-EA02-0EEDE356C911}"/>
-              </a:ext>
-            </a:extLst>
-          </p:cNvPr>
-          <p:cNvSpPr>
-            <a:spLocks noGrp="1"/>
-          </p:cNvSpPr>
-          <p:nvPr>
-            <p:ph type="body" idx="1"/>
-          </p:nvPr>
-        </p:nvSpPr>
-        <p:spPr/>
-        <p:txBody>
-          <a:bodyPr/>
-          <a:lstStyle/>
-          <a:p>
-            <a:endParaRPr lang="fr-FR" dirty="0"/>
-          </a:p>
-        </p:txBody>
-      </p:sp>
-      <p:sp>
-        <p:nvSpPr>
-          <p:cNvPr id="4" name="Espace réservé du numéro de diapositive 3">
-            <a:extLst>
-              <a:ext uri="{FF2B5EF4-FFF2-40B4-BE49-F238E27FC236}">
-                <a16:creationId xmlns:a16="http://schemas.microsoft.com/office/drawing/2014/main" id="{8695B049-66C2-B44C-D3BA-30A6938FE4BC}"/>
-              </a:ext>
-            </a:extLst>
-          </p:cNvPr>
-          <p:cNvSpPr>
-            <a:spLocks noGrp="1"/>
-          </p:cNvSpPr>
-          <p:nvPr>
-            <p:ph type="sldNum" sz="quarter" idx="5"/>
-          </p:nvPr>
-        </p:nvSpPr>
-        <p:spPr/>
-        <p:txBody>
-          <a:bodyPr/>
-          <a:lstStyle/>
-          <a:p>
-            <a:fld id="{EB0C3375-AD00-2849-8B47-02ED823D7559}" type="slidenum">
-              <a:rPr lang="fr-FR" smtClean="0"/>
-              <a:t>21</a:t>
-            </a:fld>
-            <a:endParaRPr lang="fr-FR"/>
-          </a:p>
-        </p:txBody>
-      </p:sp>
-    </p:spTree>
-    <p:extLst>
-      <p:ext uri="{BB962C8B-B14F-4D97-AF65-F5344CB8AC3E}">
-        <p14:creationId xmlns:p14="http://schemas.microsoft.com/office/powerpoint/2010/main" val="3296688803"/>
-      </p:ext>
-    </p:extLst>
-  </p:cSld>
-  <p:clrMapOvr>
-    <a:masterClrMapping/>
-  </p:clrMapOvr>
-</p:notes>
-</file>
-
-<file path=ppt/notesSlides/notesSlide22.xml><?xml version="1.0" encoding="utf-8"?>
-<p:notes xmlns:a="http://schemas.openxmlformats.org/drawingml/2006/main" xmlns:r="http://schemas.openxmlformats.org/officeDocument/2006/relationships" xmlns:p="http://schemas.openxmlformats.org/presentationml/2006/main">
-  <p:cSld>
-    <p:spTree>
-      <p:nvGrpSpPr>
-        <p:cNvPr id="1" name="">
-          <a:extLst>
-            <a:ext uri="{FF2B5EF4-FFF2-40B4-BE49-F238E27FC236}">
-              <a16:creationId xmlns:a16="http://schemas.microsoft.com/office/drawing/2014/main" id="{93C11A7E-4646-B6FB-2B53-97F31F9A9C49}"/>
-            </a:ext>
-          </a:extLst>
-        </p:cNvPr>
-        <p:cNvGrpSpPr/>
-        <p:nvPr/>
-      </p:nvGrpSpPr>
-      <p:grpSpPr>
-        <a:xfrm>
-          <a:off x="0" y="0"/>
-          <a:ext cx="0" cy="0"/>
-          <a:chOff x="0" y="0"/>
-          <a:chExt cx="0" cy="0"/>
-        </a:xfrm>
-      </p:grpSpPr>
-      <p:sp>
-        <p:nvSpPr>
-          <p:cNvPr id="2" name="Espace réservé de l'image des diapositives 1">
-            <a:extLst>
-              <a:ext uri="{FF2B5EF4-FFF2-40B4-BE49-F238E27FC236}">
-                <a16:creationId xmlns:a16="http://schemas.microsoft.com/office/drawing/2014/main" id="{4A1AFE55-B6F8-2204-C2FB-4552E4A97831}"/>
-              </a:ext>
-            </a:extLst>
-          </p:cNvPr>
-          <p:cNvSpPr>
-            <a:spLocks noGrp="1" noRot="1" noChangeAspect="1"/>
-          </p:cNvSpPr>
-          <p:nvPr>
-            <p:ph type="sldImg"/>
-          </p:nvPr>
-        </p:nvSpPr>
-        <p:spPr/>
-      </p:sp>
-      <p:sp>
-        <p:nvSpPr>
-          <p:cNvPr id="3" name="Espace réservé des notes 2">
-            <a:extLst>
-              <a:ext uri="{FF2B5EF4-FFF2-40B4-BE49-F238E27FC236}">
-                <a16:creationId xmlns:a16="http://schemas.microsoft.com/office/drawing/2014/main" id="{5789D098-6A73-1198-4406-45943C74189F}"/>
-              </a:ext>
-            </a:extLst>
-          </p:cNvPr>
-          <p:cNvSpPr>
-            <a:spLocks noGrp="1"/>
-          </p:cNvSpPr>
-          <p:nvPr>
-            <p:ph type="body" idx="1"/>
-          </p:nvPr>
-        </p:nvSpPr>
-        <p:spPr/>
-        <p:txBody>
-          <a:bodyPr/>
-          <a:lstStyle/>
-          <a:p>
-            <a:endParaRPr lang="fr-FR" dirty="0"/>
-          </a:p>
-        </p:txBody>
-      </p:sp>
-      <p:sp>
-        <p:nvSpPr>
-          <p:cNvPr id="4" name="Espace réservé du numéro de diapositive 3">
-            <a:extLst>
-              <a:ext uri="{FF2B5EF4-FFF2-40B4-BE49-F238E27FC236}">
-                <a16:creationId xmlns:a16="http://schemas.microsoft.com/office/drawing/2014/main" id="{3A16D995-1F2F-F047-9953-519E94397D9D}"/>
-              </a:ext>
-            </a:extLst>
-          </p:cNvPr>
-          <p:cNvSpPr>
-            <a:spLocks noGrp="1"/>
-          </p:cNvSpPr>
-          <p:nvPr>
-            <p:ph type="sldNum" sz="quarter" idx="5"/>
-          </p:nvPr>
-        </p:nvSpPr>
-        <p:spPr/>
-        <p:txBody>
-          <a:bodyPr/>
-          <a:lstStyle/>
-          <a:p>
-            <a:fld id="{EB0C3375-AD00-2849-8B47-02ED823D7559}" type="slidenum">
-              <a:rPr lang="fr-FR" smtClean="0"/>
-              <a:t>22</a:t>
-            </a:fld>
-            <a:endParaRPr lang="fr-FR"/>
-          </a:p>
-        </p:txBody>
-      </p:sp>
-    </p:spTree>
-    <p:extLst>
-      <p:ext uri="{BB962C8B-B14F-4D97-AF65-F5344CB8AC3E}">
-        <p14:creationId xmlns:p14="http://schemas.microsoft.com/office/powerpoint/2010/main" val="2224721334"/>
       </p:ext>
     </p:extLst>
   </p:cSld>
@@ -3273,7 +2837,7 @@
           <a:p>
             <a:fld id="{B31D952E-9AEA-B24E-B6B1-F2B5D1DED824}" type="datetimeFigureOut">
               <a:rPr lang="fr-FR" smtClean="0"/>
-              <a:t>31/01/2024</a:t>
+              <a:t>01/02/2024</a:t>
             </a:fld>
             <a:endParaRPr lang="fr-FR"/>
           </a:p>
@@ -3471,7 +3035,7 @@
           <a:p>
             <a:fld id="{B31D952E-9AEA-B24E-B6B1-F2B5D1DED824}" type="datetimeFigureOut">
               <a:rPr lang="fr-FR" smtClean="0"/>
-              <a:t>31/01/2024</a:t>
+              <a:t>01/02/2024</a:t>
             </a:fld>
             <a:endParaRPr lang="fr-FR"/>
           </a:p>
@@ -3679,7 +3243,7 @@
           <a:p>
             <a:fld id="{B31D952E-9AEA-B24E-B6B1-F2B5D1DED824}" type="datetimeFigureOut">
               <a:rPr lang="fr-FR" smtClean="0"/>
-              <a:t>31/01/2024</a:t>
+              <a:t>01/02/2024</a:t>
             </a:fld>
             <a:endParaRPr lang="fr-FR"/>
           </a:p>
@@ -3877,7 +3441,7 @@
           <a:p>
             <a:fld id="{B31D952E-9AEA-B24E-B6B1-F2B5D1DED824}" type="datetimeFigureOut">
               <a:rPr lang="fr-FR" smtClean="0"/>
-              <a:t>31/01/2024</a:t>
+              <a:t>01/02/2024</a:t>
             </a:fld>
             <a:endParaRPr lang="fr-FR"/>
           </a:p>
@@ -4152,7 +3716,7 @@
           <a:p>
             <a:fld id="{B31D952E-9AEA-B24E-B6B1-F2B5D1DED824}" type="datetimeFigureOut">
               <a:rPr lang="fr-FR" smtClean="0"/>
-              <a:t>31/01/2024</a:t>
+              <a:t>01/02/2024</a:t>
             </a:fld>
             <a:endParaRPr lang="fr-FR"/>
           </a:p>
@@ -4417,7 +3981,7 @@
           <a:p>
             <a:fld id="{B31D952E-9AEA-B24E-B6B1-F2B5D1DED824}" type="datetimeFigureOut">
               <a:rPr lang="fr-FR" smtClean="0"/>
-              <a:t>31/01/2024</a:t>
+              <a:t>01/02/2024</a:t>
             </a:fld>
             <a:endParaRPr lang="fr-FR"/>
           </a:p>
@@ -4829,7 +4393,7 @@
           <a:p>
             <a:fld id="{B31D952E-9AEA-B24E-B6B1-F2B5D1DED824}" type="datetimeFigureOut">
               <a:rPr lang="fr-FR" smtClean="0"/>
-              <a:t>31/01/2024</a:t>
+              <a:t>01/02/2024</a:t>
             </a:fld>
             <a:endParaRPr lang="fr-FR"/>
           </a:p>
@@ -4970,7 +4534,7 @@
           <a:p>
             <a:fld id="{B31D952E-9AEA-B24E-B6B1-F2B5D1DED824}" type="datetimeFigureOut">
               <a:rPr lang="fr-FR" smtClean="0"/>
-              <a:t>31/01/2024</a:t>
+              <a:t>01/02/2024</a:t>
             </a:fld>
             <a:endParaRPr lang="fr-FR"/>
           </a:p>
@@ -5083,7 +4647,7 @@
           <a:p>
             <a:fld id="{B31D952E-9AEA-B24E-B6B1-F2B5D1DED824}" type="datetimeFigureOut">
               <a:rPr lang="fr-FR" smtClean="0"/>
-              <a:t>31/01/2024</a:t>
+              <a:t>01/02/2024</a:t>
             </a:fld>
             <a:endParaRPr lang="fr-FR"/>
           </a:p>
@@ -5394,7 +4958,7 @@
           <a:p>
             <a:fld id="{B31D952E-9AEA-B24E-B6B1-F2B5D1DED824}" type="datetimeFigureOut">
               <a:rPr lang="fr-FR" smtClean="0"/>
-              <a:t>31/01/2024</a:t>
+              <a:t>01/02/2024</a:t>
             </a:fld>
             <a:endParaRPr lang="fr-FR"/>
           </a:p>
@@ -5682,7 +5246,7 @@
           <a:p>
             <a:fld id="{B31D952E-9AEA-B24E-B6B1-F2B5D1DED824}" type="datetimeFigureOut">
               <a:rPr lang="fr-FR" smtClean="0"/>
-              <a:t>31/01/2024</a:t>
+              <a:t>01/02/2024</a:t>
             </a:fld>
             <a:endParaRPr lang="fr-FR"/>
           </a:p>
@@ -5923,7 +5487,7 @@
           <a:p>
             <a:fld id="{B31D952E-9AEA-B24E-B6B1-F2B5D1DED824}" type="datetimeFigureOut">
               <a:rPr lang="fr-FR" smtClean="0"/>
-              <a:t>31/01/2024</a:t>
+              <a:t>01/02/2024</a:t>
             </a:fld>
             <a:endParaRPr lang="fr-FR"/>
           </a:p>
@@ -6803,105 +6367,6 @@
           </a:p>
         </p:txBody>
       </p:sp>
-      <p:sp>
-        <p:nvSpPr>
-          <p:cNvPr id="48" name="Forme libre 47">
-            <a:extLst>
-              <a:ext uri="{FF2B5EF4-FFF2-40B4-BE49-F238E27FC236}">
-                <a16:creationId xmlns:a16="http://schemas.microsoft.com/office/drawing/2014/main" id="{2E610A68-EC77-3C97-B81C-B9CD4E8A3C72}"/>
-              </a:ext>
-            </a:extLst>
-          </p:cNvPr>
-          <p:cNvSpPr/>
-          <p:nvPr/>
-        </p:nvSpPr>
-        <p:spPr>
-          <a:xfrm>
-            <a:off x="0" y="6346586"/>
-            <a:ext cx="330200" cy="660400"/>
-          </a:xfrm>
-          <a:custGeom>
-            <a:avLst/>
-            <a:gdLst>
-              <a:gd name="connsiteX0" fmla="*/ 0 w 330200"/>
-              <a:gd name="connsiteY0" fmla="*/ 0 h 660400"/>
-              <a:gd name="connsiteX1" fmla="*/ 330200 w 330200"/>
-              <a:gd name="connsiteY1" fmla="*/ 330200 h 660400"/>
-              <a:gd name="connsiteX2" fmla="*/ 0 w 330200"/>
-              <a:gd name="connsiteY2" fmla="*/ 660400 h 660400"/>
-              <a:gd name="connsiteX3" fmla="*/ 0 w 330200"/>
-              <a:gd name="connsiteY3" fmla="*/ 0 h 660400"/>
-            </a:gdLst>
-            <a:ahLst/>
-            <a:cxnLst>
-              <a:cxn ang="0">
-                <a:pos x="connsiteX0" y="connsiteY0"/>
-              </a:cxn>
-              <a:cxn ang="0">
-                <a:pos x="connsiteX1" y="connsiteY1"/>
-              </a:cxn>
-              <a:cxn ang="0">
-                <a:pos x="connsiteX2" y="connsiteY2"/>
-              </a:cxn>
-              <a:cxn ang="0">
-                <a:pos x="connsiteX3" y="connsiteY3"/>
-              </a:cxn>
-            </a:cxnLst>
-            <a:rect l="l" t="t" r="r" b="b"/>
-            <a:pathLst>
-              <a:path w="330200" h="660400">
-                <a:moveTo>
-                  <a:pt x="0" y="0"/>
-                </a:moveTo>
-                <a:cubicBezTo>
-                  <a:pt x="182364" y="0"/>
-                  <a:pt x="330200" y="147836"/>
-                  <a:pt x="330200" y="330200"/>
-                </a:cubicBezTo>
-                <a:cubicBezTo>
-                  <a:pt x="330200" y="512564"/>
-                  <a:pt x="182364" y="660400"/>
-                  <a:pt x="0" y="660400"/>
-                </a:cubicBezTo>
-                <a:lnTo>
-                  <a:pt x="0" y="0"/>
-                </a:lnTo>
-                <a:close/>
-              </a:path>
-            </a:pathLst>
-          </a:custGeom>
-          <a:solidFill>
-            <a:srgbClr val="F3103A"/>
-          </a:solidFill>
-          <a:ln>
-            <a:noFill/>
-          </a:ln>
-        </p:spPr>
-        <p:style>
-          <a:lnRef idx="0">
-            <a:scrgbClr r="0" g="0" b="0"/>
-          </a:lnRef>
-          <a:fillRef idx="0">
-            <a:scrgbClr r="0" g="0" b="0"/>
-          </a:fillRef>
-          <a:effectRef idx="0">
-            <a:scrgbClr r="0" g="0" b="0"/>
-          </a:effectRef>
-          <a:fontRef idx="minor">
-            <a:schemeClr val="lt1"/>
-          </a:fontRef>
-        </p:style>
-        <p:txBody>
-          <a:bodyPr wrap="square" rtlCol="0" anchor="ctr">
-            <a:noAutofit/>
-          </a:bodyPr>
-          <a:lstStyle/>
-          <a:p>
-            <a:pPr algn="ctr"/>
-            <a:endParaRPr lang="fr-FR"/>
-          </a:p>
-        </p:txBody>
-      </p:sp>
       <p:pic>
         <p:nvPicPr>
           <p:cNvPr id="16" name="Image 15">
@@ -7566,105 +7031,6 @@
           </a:p>
         </p:txBody>
       </p:sp>
-      <p:sp>
-        <p:nvSpPr>
-          <p:cNvPr id="48" name="Forme libre 47">
-            <a:extLst>
-              <a:ext uri="{FF2B5EF4-FFF2-40B4-BE49-F238E27FC236}">
-                <a16:creationId xmlns:a16="http://schemas.microsoft.com/office/drawing/2014/main" id="{A3182EBB-B116-002E-5B7D-E915281450EC}"/>
-              </a:ext>
-            </a:extLst>
-          </p:cNvPr>
-          <p:cNvSpPr/>
-          <p:nvPr/>
-        </p:nvSpPr>
-        <p:spPr>
-          <a:xfrm>
-            <a:off x="0" y="6346586"/>
-            <a:ext cx="330200" cy="660400"/>
-          </a:xfrm>
-          <a:custGeom>
-            <a:avLst/>
-            <a:gdLst>
-              <a:gd name="connsiteX0" fmla="*/ 0 w 330200"/>
-              <a:gd name="connsiteY0" fmla="*/ 0 h 660400"/>
-              <a:gd name="connsiteX1" fmla="*/ 330200 w 330200"/>
-              <a:gd name="connsiteY1" fmla="*/ 330200 h 660400"/>
-              <a:gd name="connsiteX2" fmla="*/ 0 w 330200"/>
-              <a:gd name="connsiteY2" fmla="*/ 660400 h 660400"/>
-              <a:gd name="connsiteX3" fmla="*/ 0 w 330200"/>
-              <a:gd name="connsiteY3" fmla="*/ 0 h 660400"/>
-            </a:gdLst>
-            <a:ahLst/>
-            <a:cxnLst>
-              <a:cxn ang="0">
-                <a:pos x="connsiteX0" y="connsiteY0"/>
-              </a:cxn>
-              <a:cxn ang="0">
-                <a:pos x="connsiteX1" y="connsiteY1"/>
-              </a:cxn>
-              <a:cxn ang="0">
-                <a:pos x="connsiteX2" y="connsiteY2"/>
-              </a:cxn>
-              <a:cxn ang="0">
-                <a:pos x="connsiteX3" y="connsiteY3"/>
-              </a:cxn>
-            </a:cxnLst>
-            <a:rect l="l" t="t" r="r" b="b"/>
-            <a:pathLst>
-              <a:path w="330200" h="660400">
-                <a:moveTo>
-                  <a:pt x="0" y="0"/>
-                </a:moveTo>
-                <a:cubicBezTo>
-                  <a:pt x="182364" y="0"/>
-                  <a:pt x="330200" y="147836"/>
-                  <a:pt x="330200" y="330200"/>
-                </a:cubicBezTo>
-                <a:cubicBezTo>
-                  <a:pt x="330200" y="512564"/>
-                  <a:pt x="182364" y="660400"/>
-                  <a:pt x="0" y="660400"/>
-                </a:cubicBezTo>
-                <a:lnTo>
-                  <a:pt x="0" y="0"/>
-                </a:lnTo>
-                <a:close/>
-              </a:path>
-            </a:pathLst>
-          </a:custGeom>
-          <a:solidFill>
-            <a:srgbClr val="F3103A"/>
-          </a:solidFill>
-          <a:ln>
-            <a:noFill/>
-          </a:ln>
-        </p:spPr>
-        <p:style>
-          <a:lnRef idx="0">
-            <a:scrgbClr r="0" g="0" b="0"/>
-          </a:lnRef>
-          <a:fillRef idx="0">
-            <a:scrgbClr r="0" g="0" b="0"/>
-          </a:fillRef>
-          <a:effectRef idx="0">
-            <a:scrgbClr r="0" g="0" b="0"/>
-          </a:effectRef>
-          <a:fontRef idx="minor">
-            <a:schemeClr val="lt1"/>
-          </a:fontRef>
-        </p:style>
-        <p:txBody>
-          <a:bodyPr wrap="square" rtlCol="0" anchor="ctr">
-            <a:noAutofit/>
-          </a:bodyPr>
-          <a:lstStyle/>
-          <a:p>
-            <a:pPr algn="ctr"/>
-            <a:endParaRPr lang="fr-FR"/>
-          </a:p>
-        </p:txBody>
-      </p:sp>
       <p:pic>
         <p:nvPicPr>
           <p:cNvPr id="16" name="Image 15">
@@ -8329,105 +7695,6 @@
           </a:p>
         </p:txBody>
       </p:sp>
-      <p:sp>
-        <p:nvSpPr>
-          <p:cNvPr id="48" name="Forme libre 47">
-            <a:extLst>
-              <a:ext uri="{FF2B5EF4-FFF2-40B4-BE49-F238E27FC236}">
-                <a16:creationId xmlns:a16="http://schemas.microsoft.com/office/drawing/2014/main" id="{8C874CBB-B5DF-47F1-B53B-A8BB6471CF25}"/>
-              </a:ext>
-            </a:extLst>
-          </p:cNvPr>
-          <p:cNvSpPr/>
-          <p:nvPr/>
-        </p:nvSpPr>
-        <p:spPr>
-          <a:xfrm>
-            <a:off x="0" y="6346586"/>
-            <a:ext cx="330200" cy="660400"/>
-          </a:xfrm>
-          <a:custGeom>
-            <a:avLst/>
-            <a:gdLst>
-              <a:gd name="connsiteX0" fmla="*/ 0 w 330200"/>
-              <a:gd name="connsiteY0" fmla="*/ 0 h 660400"/>
-              <a:gd name="connsiteX1" fmla="*/ 330200 w 330200"/>
-              <a:gd name="connsiteY1" fmla="*/ 330200 h 660400"/>
-              <a:gd name="connsiteX2" fmla="*/ 0 w 330200"/>
-              <a:gd name="connsiteY2" fmla="*/ 660400 h 660400"/>
-              <a:gd name="connsiteX3" fmla="*/ 0 w 330200"/>
-              <a:gd name="connsiteY3" fmla="*/ 0 h 660400"/>
-            </a:gdLst>
-            <a:ahLst/>
-            <a:cxnLst>
-              <a:cxn ang="0">
-                <a:pos x="connsiteX0" y="connsiteY0"/>
-              </a:cxn>
-              <a:cxn ang="0">
-                <a:pos x="connsiteX1" y="connsiteY1"/>
-              </a:cxn>
-              <a:cxn ang="0">
-                <a:pos x="connsiteX2" y="connsiteY2"/>
-              </a:cxn>
-              <a:cxn ang="0">
-                <a:pos x="connsiteX3" y="connsiteY3"/>
-              </a:cxn>
-            </a:cxnLst>
-            <a:rect l="l" t="t" r="r" b="b"/>
-            <a:pathLst>
-              <a:path w="330200" h="660400">
-                <a:moveTo>
-                  <a:pt x="0" y="0"/>
-                </a:moveTo>
-                <a:cubicBezTo>
-                  <a:pt x="182364" y="0"/>
-                  <a:pt x="330200" y="147836"/>
-                  <a:pt x="330200" y="330200"/>
-                </a:cubicBezTo>
-                <a:cubicBezTo>
-                  <a:pt x="330200" y="512564"/>
-                  <a:pt x="182364" y="660400"/>
-                  <a:pt x="0" y="660400"/>
-                </a:cubicBezTo>
-                <a:lnTo>
-                  <a:pt x="0" y="0"/>
-                </a:lnTo>
-                <a:close/>
-              </a:path>
-            </a:pathLst>
-          </a:custGeom>
-          <a:solidFill>
-            <a:srgbClr val="F3103A"/>
-          </a:solidFill>
-          <a:ln>
-            <a:noFill/>
-          </a:ln>
-        </p:spPr>
-        <p:style>
-          <a:lnRef idx="0">
-            <a:scrgbClr r="0" g="0" b="0"/>
-          </a:lnRef>
-          <a:fillRef idx="0">
-            <a:scrgbClr r="0" g="0" b="0"/>
-          </a:fillRef>
-          <a:effectRef idx="0">
-            <a:scrgbClr r="0" g="0" b="0"/>
-          </a:effectRef>
-          <a:fontRef idx="minor">
-            <a:schemeClr val="lt1"/>
-          </a:fontRef>
-        </p:style>
-        <p:txBody>
-          <a:bodyPr wrap="square" rtlCol="0" anchor="ctr">
-            <a:noAutofit/>
-          </a:bodyPr>
-          <a:lstStyle/>
-          <a:p>
-            <a:pPr algn="ctr"/>
-            <a:endParaRPr lang="fr-FR"/>
-          </a:p>
-        </p:txBody>
-      </p:sp>
       <p:pic>
         <p:nvPicPr>
           <p:cNvPr id="16" name="Image 15">
@@ -9063,105 +8330,6 @@
           </a:custGeom>
           <a:solidFill>
             <a:srgbClr val="FA3EE0"/>
-          </a:solidFill>
-          <a:ln>
-            <a:noFill/>
-          </a:ln>
-        </p:spPr>
-        <p:style>
-          <a:lnRef idx="0">
-            <a:scrgbClr r="0" g="0" b="0"/>
-          </a:lnRef>
-          <a:fillRef idx="0">
-            <a:scrgbClr r="0" g="0" b="0"/>
-          </a:fillRef>
-          <a:effectRef idx="0">
-            <a:scrgbClr r="0" g="0" b="0"/>
-          </a:effectRef>
-          <a:fontRef idx="minor">
-            <a:schemeClr val="lt1"/>
-          </a:fontRef>
-        </p:style>
-        <p:txBody>
-          <a:bodyPr wrap="square" rtlCol="0" anchor="ctr">
-            <a:noAutofit/>
-          </a:bodyPr>
-          <a:lstStyle/>
-          <a:p>
-            <a:pPr algn="ctr"/>
-            <a:endParaRPr lang="fr-FR"/>
-          </a:p>
-        </p:txBody>
-      </p:sp>
-      <p:sp>
-        <p:nvSpPr>
-          <p:cNvPr id="48" name="Forme libre 47">
-            <a:extLst>
-              <a:ext uri="{FF2B5EF4-FFF2-40B4-BE49-F238E27FC236}">
-                <a16:creationId xmlns:a16="http://schemas.microsoft.com/office/drawing/2014/main" id="{BD9CDFE8-640C-D12C-37A1-F2EF6FA47EEE}"/>
-              </a:ext>
-            </a:extLst>
-          </p:cNvPr>
-          <p:cNvSpPr/>
-          <p:nvPr/>
-        </p:nvSpPr>
-        <p:spPr>
-          <a:xfrm>
-            <a:off x="0" y="6346586"/>
-            <a:ext cx="330200" cy="660400"/>
-          </a:xfrm>
-          <a:custGeom>
-            <a:avLst/>
-            <a:gdLst>
-              <a:gd name="connsiteX0" fmla="*/ 0 w 330200"/>
-              <a:gd name="connsiteY0" fmla="*/ 0 h 660400"/>
-              <a:gd name="connsiteX1" fmla="*/ 330200 w 330200"/>
-              <a:gd name="connsiteY1" fmla="*/ 330200 h 660400"/>
-              <a:gd name="connsiteX2" fmla="*/ 0 w 330200"/>
-              <a:gd name="connsiteY2" fmla="*/ 660400 h 660400"/>
-              <a:gd name="connsiteX3" fmla="*/ 0 w 330200"/>
-              <a:gd name="connsiteY3" fmla="*/ 0 h 660400"/>
-            </a:gdLst>
-            <a:ahLst/>
-            <a:cxnLst>
-              <a:cxn ang="0">
-                <a:pos x="connsiteX0" y="connsiteY0"/>
-              </a:cxn>
-              <a:cxn ang="0">
-                <a:pos x="connsiteX1" y="connsiteY1"/>
-              </a:cxn>
-              <a:cxn ang="0">
-                <a:pos x="connsiteX2" y="connsiteY2"/>
-              </a:cxn>
-              <a:cxn ang="0">
-                <a:pos x="connsiteX3" y="connsiteY3"/>
-              </a:cxn>
-            </a:cxnLst>
-            <a:rect l="l" t="t" r="r" b="b"/>
-            <a:pathLst>
-              <a:path w="330200" h="660400">
-                <a:moveTo>
-                  <a:pt x="0" y="0"/>
-                </a:moveTo>
-                <a:cubicBezTo>
-                  <a:pt x="182364" y="0"/>
-                  <a:pt x="330200" y="147836"/>
-                  <a:pt x="330200" y="330200"/>
-                </a:cubicBezTo>
-                <a:cubicBezTo>
-                  <a:pt x="330200" y="512564"/>
-                  <a:pt x="182364" y="660400"/>
-                  <a:pt x="0" y="660400"/>
-                </a:cubicBezTo>
-                <a:lnTo>
-                  <a:pt x="0" y="0"/>
-                </a:lnTo>
-                <a:close/>
-              </a:path>
-            </a:pathLst>
-          </a:custGeom>
-          <a:solidFill>
-            <a:srgbClr val="F3103A"/>
           </a:solidFill>
           <a:ln>
             <a:noFill/>
@@ -9847,105 +9015,6 @@
           </a:p>
         </p:txBody>
       </p:sp>
-      <p:sp>
-        <p:nvSpPr>
-          <p:cNvPr id="48" name="Forme libre 47">
-            <a:extLst>
-              <a:ext uri="{FF2B5EF4-FFF2-40B4-BE49-F238E27FC236}">
-                <a16:creationId xmlns:a16="http://schemas.microsoft.com/office/drawing/2014/main" id="{094AA281-AD63-8295-6DCE-5E16E6B6D447}"/>
-              </a:ext>
-            </a:extLst>
-          </p:cNvPr>
-          <p:cNvSpPr/>
-          <p:nvPr/>
-        </p:nvSpPr>
-        <p:spPr>
-          <a:xfrm>
-            <a:off x="0" y="6346586"/>
-            <a:ext cx="330200" cy="660400"/>
-          </a:xfrm>
-          <a:custGeom>
-            <a:avLst/>
-            <a:gdLst>
-              <a:gd name="connsiteX0" fmla="*/ 0 w 330200"/>
-              <a:gd name="connsiteY0" fmla="*/ 0 h 660400"/>
-              <a:gd name="connsiteX1" fmla="*/ 330200 w 330200"/>
-              <a:gd name="connsiteY1" fmla="*/ 330200 h 660400"/>
-              <a:gd name="connsiteX2" fmla="*/ 0 w 330200"/>
-              <a:gd name="connsiteY2" fmla="*/ 660400 h 660400"/>
-              <a:gd name="connsiteX3" fmla="*/ 0 w 330200"/>
-              <a:gd name="connsiteY3" fmla="*/ 0 h 660400"/>
-            </a:gdLst>
-            <a:ahLst/>
-            <a:cxnLst>
-              <a:cxn ang="0">
-                <a:pos x="connsiteX0" y="connsiteY0"/>
-              </a:cxn>
-              <a:cxn ang="0">
-                <a:pos x="connsiteX1" y="connsiteY1"/>
-              </a:cxn>
-              <a:cxn ang="0">
-                <a:pos x="connsiteX2" y="connsiteY2"/>
-              </a:cxn>
-              <a:cxn ang="0">
-                <a:pos x="connsiteX3" y="connsiteY3"/>
-              </a:cxn>
-            </a:cxnLst>
-            <a:rect l="l" t="t" r="r" b="b"/>
-            <a:pathLst>
-              <a:path w="330200" h="660400">
-                <a:moveTo>
-                  <a:pt x="0" y="0"/>
-                </a:moveTo>
-                <a:cubicBezTo>
-                  <a:pt x="182364" y="0"/>
-                  <a:pt x="330200" y="147836"/>
-                  <a:pt x="330200" y="330200"/>
-                </a:cubicBezTo>
-                <a:cubicBezTo>
-                  <a:pt x="330200" y="512564"/>
-                  <a:pt x="182364" y="660400"/>
-                  <a:pt x="0" y="660400"/>
-                </a:cubicBezTo>
-                <a:lnTo>
-                  <a:pt x="0" y="0"/>
-                </a:lnTo>
-                <a:close/>
-              </a:path>
-            </a:pathLst>
-          </a:custGeom>
-          <a:solidFill>
-            <a:srgbClr val="F3103A"/>
-          </a:solidFill>
-          <a:ln>
-            <a:noFill/>
-          </a:ln>
-        </p:spPr>
-        <p:style>
-          <a:lnRef idx="0">
-            <a:scrgbClr r="0" g="0" b="0"/>
-          </a:lnRef>
-          <a:fillRef idx="0">
-            <a:scrgbClr r="0" g="0" b="0"/>
-          </a:fillRef>
-          <a:effectRef idx="0">
-            <a:scrgbClr r="0" g="0" b="0"/>
-          </a:effectRef>
-          <a:fontRef idx="minor">
-            <a:schemeClr val="lt1"/>
-          </a:fontRef>
-        </p:style>
-        <p:txBody>
-          <a:bodyPr wrap="square" rtlCol="0" anchor="ctr">
-            <a:noAutofit/>
-          </a:bodyPr>
-          <a:lstStyle/>
-          <a:p>
-            <a:pPr algn="ctr"/>
-            <a:endParaRPr lang="fr-FR"/>
-          </a:p>
-        </p:txBody>
-      </p:sp>
       <p:pic>
         <p:nvPicPr>
           <p:cNvPr id="16" name="Image 15">
@@ -10406,105 +9475,6 @@
           </a:p>
         </p:txBody>
       </p:sp>
-      <p:sp>
-        <p:nvSpPr>
-          <p:cNvPr id="48" name="Forme libre 47">
-            <a:extLst>
-              <a:ext uri="{FF2B5EF4-FFF2-40B4-BE49-F238E27FC236}">
-                <a16:creationId xmlns:a16="http://schemas.microsoft.com/office/drawing/2014/main" id="{2D038248-B620-59D6-88D4-99B972EDBCB2}"/>
-              </a:ext>
-            </a:extLst>
-          </p:cNvPr>
-          <p:cNvSpPr/>
-          <p:nvPr/>
-        </p:nvSpPr>
-        <p:spPr>
-          <a:xfrm>
-            <a:off x="0" y="5397020"/>
-            <a:ext cx="330200" cy="660400"/>
-          </a:xfrm>
-          <a:custGeom>
-            <a:avLst/>
-            <a:gdLst>
-              <a:gd name="connsiteX0" fmla="*/ 0 w 330200"/>
-              <a:gd name="connsiteY0" fmla="*/ 0 h 660400"/>
-              <a:gd name="connsiteX1" fmla="*/ 330200 w 330200"/>
-              <a:gd name="connsiteY1" fmla="*/ 330200 h 660400"/>
-              <a:gd name="connsiteX2" fmla="*/ 0 w 330200"/>
-              <a:gd name="connsiteY2" fmla="*/ 660400 h 660400"/>
-              <a:gd name="connsiteX3" fmla="*/ 0 w 330200"/>
-              <a:gd name="connsiteY3" fmla="*/ 0 h 660400"/>
-            </a:gdLst>
-            <a:ahLst/>
-            <a:cxnLst>
-              <a:cxn ang="0">
-                <a:pos x="connsiteX0" y="connsiteY0"/>
-              </a:cxn>
-              <a:cxn ang="0">
-                <a:pos x="connsiteX1" y="connsiteY1"/>
-              </a:cxn>
-              <a:cxn ang="0">
-                <a:pos x="connsiteX2" y="connsiteY2"/>
-              </a:cxn>
-              <a:cxn ang="0">
-                <a:pos x="connsiteX3" y="connsiteY3"/>
-              </a:cxn>
-            </a:cxnLst>
-            <a:rect l="l" t="t" r="r" b="b"/>
-            <a:pathLst>
-              <a:path w="330200" h="660400">
-                <a:moveTo>
-                  <a:pt x="0" y="0"/>
-                </a:moveTo>
-                <a:cubicBezTo>
-                  <a:pt x="182364" y="0"/>
-                  <a:pt x="330200" y="147836"/>
-                  <a:pt x="330200" y="330200"/>
-                </a:cubicBezTo>
-                <a:cubicBezTo>
-                  <a:pt x="330200" y="512564"/>
-                  <a:pt x="182364" y="660400"/>
-                  <a:pt x="0" y="660400"/>
-                </a:cubicBezTo>
-                <a:lnTo>
-                  <a:pt x="0" y="0"/>
-                </a:lnTo>
-                <a:close/>
-              </a:path>
-            </a:pathLst>
-          </a:custGeom>
-          <a:solidFill>
-            <a:srgbClr val="F3103A"/>
-          </a:solidFill>
-          <a:ln>
-            <a:noFill/>
-          </a:ln>
-        </p:spPr>
-        <p:style>
-          <a:lnRef idx="0">
-            <a:scrgbClr r="0" g="0" b="0"/>
-          </a:lnRef>
-          <a:fillRef idx="0">
-            <a:scrgbClr r="0" g="0" b="0"/>
-          </a:fillRef>
-          <a:effectRef idx="0">
-            <a:scrgbClr r="0" g="0" b="0"/>
-          </a:effectRef>
-          <a:fontRef idx="minor">
-            <a:schemeClr val="lt1"/>
-          </a:fontRef>
-        </p:style>
-        <p:txBody>
-          <a:bodyPr wrap="square" rtlCol="0" anchor="ctr">
-            <a:noAutofit/>
-          </a:bodyPr>
-          <a:lstStyle/>
-          <a:p>
-            <a:pPr algn="ctr"/>
-            <a:endParaRPr lang="fr-FR"/>
-          </a:p>
-        </p:txBody>
-      </p:sp>
       <p:pic>
         <p:nvPicPr>
           <p:cNvPr id="16" name="Image 15">
@@ -10975,105 +9945,6 @@
           </a:p>
         </p:txBody>
       </p:sp>
-      <p:sp>
-        <p:nvSpPr>
-          <p:cNvPr id="48" name="Forme libre 47">
-            <a:extLst>
-              <a:ext uri="{FF2B5EF4-FFF2-40B4-BE49-F238E27FC236}">
-                <a16:creationId xmlns:a16="http://schemas.microsoft.com/office/drawing/2014/main" id="{18DD82BA-C46C-9818-C0A3-0B85771C7005}"/>
-              </a:ext>
-            </a:extLst>
-          </p:cNvPr>
-          <p:cNvSpPr/>
-          <p:nvPr/>
-        </p:nvSpPr>
-        <p:spPr>
-          <a:xfrm>
-            <a:off x="0" y="5397020"/>
-            <a:ext cx="330200" cy="660400"/>
-          </a:xfrm>
-          <a:custGeom>
-            <a:avLst/>
-            <a:gdLst>
-              <a:gd name="connsiteX0" fmla="*/ 0 w 330200"/>
-              <a:gd name="connsiteY0" fmla="*/ 0 h 660400"/>
-              <a:gd name="connsiteX1" fmla="*/ 330200 w 330200"/>
-              <a:gd name="connsiteY1" fmla="*/ 330200 h 660400"/>
-              <a:gd name="connsiteX2" fmla="*/ 0 w 330200"/>
-              <a:gd name="connsiteY2" fmla="*/ 660400 h 660400"/>
-              <a:gd name="connsiteX3" fmla="*/ 0 w 330200"/>
-              <a:gd name="connsiteY3" fmla="*/ 0 h 660400"/>
-            </a:gdLst>
-            <a:ahLst/>
-            <a:cxnLst>
-              <a:cxn ang="0">
-                <a:pos x="connsiteX0" y="connsiteY0"/>
-              </a:cxn>
-              <a:cxn ang="0">
-                <a:pos x="connsiteX1" y="connsiteY1"/>
-              </a:cxn>
-              <a:cxn ang="0">
-                <a:pos x="connsiteX2" y="connsiteY2"/>
-              </a:cxn>
-              <a:cxn ang="0">
-                <a:pos x="connsiteX3" y="connsiteY3"/>
-              </a:cxn>
-            </a:cxnLst>
-            <a:rect l="l" t="t" r="r" b="b"/>
-            <a:pathLst>
-              <a:path w="330200" h="660400">
-                <a:moveTo>
-                  <a:pt x="0" y="0"/>
-                </a:moveTo>
-                <a:cubicBezTo>
-                  <a:pt x="182364" y="0"/>
-                  <a:pt x="330200" y="147836"/>
-                  <a:pt x="330200" y="330200"/>
-                </a:cubicBezTo>
-                <a:cubicBezTo>
-                  <a:pt x="330200" y="512564"/>
-                  <a:pt x="182364" y="660400"/>
-                  <a:pt x="0" y="660400"/>
-                </a:cubicBezTo>
-                <a:lnTo>
-                  <a:pt x="0" y="0"/>
-                </a:lnTo>
-                <a:close/>
-              </a:path>
-            </a:pathLst>
-          </a:custGeom>
-          <a:solidFill>
-            <a:srgbClr val="F3103A"/>
-          </a:solidFill>
-          <a:ln>
-            <a:noFill/>
-          </a:ln>
-        </p:spPr>
-        <p:style>
-          <a:lnRef idx="0">
-            <a:scrgbClr r="0" g="0" b="0"/>
-          </a:lnRef>
-          <a:fillRef idx="0">
-            <a:scrgbClr r="0" g="0" b="0"/>
-          </a:fillRef>
-          <a:effectRef idx="0">
-            <a:scrgbClr r="0" g="0" b="0"/>
-          </a:effectRef>
-          <a:fontRef idx="minor">
-            <a:schemeClr val="lt1"/>
-          </a:fontRef>
-        </p:style>
-        <p:txBody>
-          <a:bodyPr wrap="square" rtlCol="0" anchor="ctr">
-            <a:noAutofit/>
-          </a:bodyPr>
-          <a:lstStyle/>
-          <a:p>
-            <a:pPr algn="ctr"/>
-            <a:endParaRPr lang="fr-FR"/>
-          </a:p>
-        </p:txBody>
-      </p:sp>
       <p:pic>
         <p:nvPicPr>
           <p:cNvPr id="16" name="Image 15">
@@ -11439,7 +10310,7 @@
         <p:cNvPr id="1" name="">
           <a:extLst>
             <a:ext uri="{FF2B5EF4-FFF2-40B4-BE49-F238E27FC236}">
-              <a16:creationId xmlns:a16="http://schemas.microsoft.com/office/drawing/2014/main" id="{6FD2F1F4-A1B4-3318-FEAD-3C73021AB5DF}"/>
+              <a16:creationId xmlns:a16="http://schemas.microsoft.com/office/drawing/2014/main" id="{21CFFE71-9B98-9B1F-4B52-78C62C0453F2}"/>
             </a:ext>
           </a:extLst>
         </p:cNvPr>
@@ -11456,45 +10327,10 @@
       </p:grpSpPr>
       <p:sp>
         <p:nvSpPr>
-          <p:cNvPr id="37" name="ZoneTexte 36">
-            <a:extLst>
-              <a:ext uri="{FF2B5EF4-FFF2-40B4-BE49-F238E27FC236}">
-                <a16:creationId xmlns:a16="http://schemas.microsoft.com/office/drawing/2014/main" id="{3B69AE5A-AFEF-2140-F430-5FFBB92302AD}"/>
-              </a:ext>
-            </a:extLst>
-          </p:cNvPr>
-          <p:cNvSpPr txBox="1"/>
-          <p:nvPr/>
-        </p:nvSpPr>
-        <p:spPr>
-          <a:xfrm>
-            <a:off x="8847191" y="34803"/>
-            <a:ext cx="3344809" cy="646331"/>
-          </a:xfrm>
-          <a:prstGeom prst="rect">
-            <a:avLst/>
-          </a:prstGeom>
-          <a:noFill/>
-        </p:spPr>
-        <p:txBody>
-          <a:bodyPr wrap="square" rtlCol="0">
-            <a:spAutoFit/>
-          </a:bodyPr>
-          <a:lstStyle/>
-          <a:p>
-            <a:r>
-              <a:rPr lang="fr-FR" sz="3600" dirty="0"/>
-              <a:t>Trucs et astuces</a:t>
-            </a:r>
-          </a:p>
-        </p:txBody>
-      </p:sp>
-      <p:sp>
-        <p:nvSpPr>
           <p:cNvPr id="53" name="Forme libre 52">
             <a:extLst>
               <a:ext uri="{FF2B5EF4-FFF2-40B4-BE49-F238E27FC236}">
-                <a16:creationId xmlns:a16="http://schemas.microsoft.com/office/drawing/2014/main" id="{D2C42CC4-DA42-F6BC-D613-06771F374F3C}"/>
+                <a16:creationId xmlns:a16="http://schemas.microsoft.com/office/drawing/2014/main" id="{9F1E427B-0882-9B77-624C-BE9021BFE934}"/>
               </a:ext>
             </a:extLst>
           </p:cNvPr>
@@ -11504,7 +10340,7 @@
         <p:spPr>
           <a:xfrm>
             <a:off x="0" y="0"/>
-            <a:ext cx="2376435" cy="6858000"/>
+            <a:ext cx="12192000" cy="6858000"/>
           </a:xfrm>
           <a:custGeom>
             <a:avLst/>
@@ -11628,138 +10464,10 @@
       </p:sp>
       <p:sp>
         <p:nvSpPr>
-          <p:cNvPr id="48" name="Forme libre 47">
-            <a:extLst>
-              <a:ext uri="{FF2B5EF4-FFF2-40B4-BE49-F238E27FC236}">
-                <a16:creationId xmlns:a16="http://schemas.microsoft.com/office/drawing/2014/main" id="{8EA09BDC-9B42-B202-71D8-2D91E510F02B}"/>
-              </a:ext>
-            </a:extLst>
-          </p:cNvPr>
-          <p:cNvSpPr/>
-          <p:nvPr/>
-        </p:nvSpPr>
-        <p:spPr>
-          <a:xfrm>
-            <a:off x="0" y="1357569"/>
-            <a:ext cx="330200" cy="660400"/>
-          </a:xfrm>
-          <a:custGeom>
-            <a:avLst/>
-            <a:gdLst>
-              <a:gd name="connsiteX0" fmla="*/ 0 w 330200"/>
-              <a:gd name="connsiteY0" fmla="*/ 0 h 660400"/>
-              <a:gd name="connsiteX1" fmla="*/ 330200 w 330200"/>
-              <a:gd name="connsiteY1" fmla="*/ 330200 h 660400"/>
-              <a:gd name="connsiteX2" fmla="*/ 0 w 330200"/>
-              <a:gd name="connsiteY2" fmla="*/ 660400 h 660400"/>
-              <a:gd name="connsiteX3" fmla="*/ 0 w 330200"/>
-              <a:gd name="connsiteY3" fmla="*/ 0 h 660400"/>
-            </a:gdLst>
-            <a:ahLst/>
-            <a:cxnLst>
-              <a:cxn ang="0">
-                <a:pos x="connsiteX0" y="connsiteY0"/>
-              </a:cxn>
-              <a:cxn ang="0">
-                <a:pos x="connsiteX1" y="connsiteY1"/>
-              </a:cxn>
-              <a:cxn ang="0">
-                <a:pos x="connsiteX2" y="connsiteY2"/>
-              </a:cxn>
-              <a:cxn ang="0">
-                <a:pos x="connsiteX3" y="connsiteY3"/>
-              </a:cxn>
-            </a:cxnLst>
-            <a:rect l="l" t="t" r="r" b="b"/>
-            <a:pathLst>
-              <a:path w="330200" h="660400">
-                <a:moveTo>
-                  <a:pt x="0" y="0"/>
-                </a:moveTo>
-                <a:cubicBezTo>
-                  <a:pt x="182364" y="0"/>
-                  <a:pt x="330200" y="147836"/>
-                  <a:pt x="330200" y="330200"/>
-                </a:cubicBezTo>
-                <a:cubicBezTo>
-                  <a:pt x="330200" y="512564"/>
-                  <a:pt x="182364" y="660400"/>
-                  <a:pt x="0" y="660400"/>
-                </a:cubicBezTo>
-                <a:lnTo>
-                  <a:pt x="0" y="0"/>
-                </a:lnTo>
-                <a:close/>
-              </a:path>
-            </a:pathLst>
-          </a:custGeom>
-          <a:solidFill>
-            <a:srgbClr val="F3103A"/>
-          </a:solidFill>
-          <a:ln>
-            <a:noFill/>
-          </a:ln>
-        </p:spPr>
-        <p:style>
-          <a:lnRef idx="0">
-            <a:scrgbClr r="0" g="0" b="0"/>
-          </a:lnRef>
-          <a:fillRef idx="0">
-            <a:scrgbClr r="0" g="0" b="0"/>
-          </a:fillRef>
-          <a:effectRef idx="0">
-            <a:scrgbClr r="0" g="0" b="0"/>
-          </a:effectRef>
-          <a:fontRef idx="minor">
-            <a:schemeClr val="lt1"/>
-          </a:fontRef>
-        </p:style>
-        <p:txBody>
-          <a:bodyPr wrap="square" rtlCol="0" anchor="ctr">
-            <a:noAutofit/>
-          </a:bodyPr>
-          <a:lstStyle/>
-          <a:p>
-            <a:pPr algn="ctr"/>
-            <a:endParaRPr lang="fr-FR"/>
-          </a:p>
-        </p:txBody>
-      </p:sp>
-      <p:pic>
-        <p:nvPicPr>
-          <p:cNvPr id="16" name="Image 15">
-            <a:extLst>
-              <a:ext uri="{FF2B5EF4-FFF2-40B4-BE49-F238E27FC236}">
-                <a16:creationId xmlns:a16="http://schemas.microsoft.com/office/drawing/2014/main" id="{4D601168-B79C-4599-57E6-78ED578B5093}"/>
-              </a:ext>
-            </a:extLst>
-          </p:cNvPr>
-          <p:cNvPicPr>
-            <a:picLocks noChangeAspect="1"/>
-          </p:cNvPicPr>
-          <p:nvPr/>
-        </p:nvPicPr>
-        <p:blipFill rotWithShape="1">
-          <a:blip r:embed="rId3"/>
-          <a:srcRect r="72930"/>
-          <a:stretch/>
-        </p:blipFill>
-        <p:spPr>
-          <a:xfrm>
-            <a:off x="637278" y="130629"/>
-            <a:ext cx="1101877" cy="1272695"/>
-          </a:xfrm>
-          <a:prstGeom prst="rect">
-            <a:avLst/>
-          </a:prstGeom>
-        </p:spPr>
-      </p:pic>
-      <p:sp>
-        <p:nvSpPr>
-          <p:cNvPr id="3" name="ZoneTexte 2">
-            <a:extLst>
-              <a:ext uri="{FF2B5EF4-FFF2-40B4-BE49-F238E27FC236}">
-                <a16:creationId xmlns:a16="http://schemas.microsoft.com/office/drawing/2014/main" id="{95F96CC4-88D0-2C3A-4F1C-A8BCB7644811}"/>
+          <p:cNvPr id="37" name="ZoneTexte 36">
+            <a:extLst>
+              <a:ext uri="{FF2B5EF4-FFF2-40B4-BE49-F238E27FC236}">
+                <a16:creationId xmlns:a16="http://schemas.microsoft.com/office/drawing/2014/main" id="{1A940947-5AD3-B5FF-4609-0AACFBF39AEE}"/>
               </a:ext>
             </a:extLst>
           </p:cNvPr>
@@ -11768,8 +10476,8 @@
         </p:nvSpPr>
         <p:spPr>
           <a:xfrm>
-            <a:off x="282573" y="1487676"/>
-            <a:ext cx="1716832" cy="400110"/>
+            <a:off x="2629367" y="4130767"/>
+            <a:ext cx="6933267" cy="769441"/>
           </a:xfrm>
           <a:prstGeom prst="rect">
             <a:avLst/>
@@ -11782,136 +10490,24 @@
           </a:bodyPr>
           <a:lstStyle/>
           <a:p>
-            <a:r>
-              <a:rPr lang="fr-FR" sz="2000" dirty="0">
+            <a:pPr algn="ctr"/>
+            <a:r>
+              <a:rPr lang="fr-FR" sz="4400" dirty="0">
                 <a:solidFill>
                   <a:schemeClr val="bg1"/>
                 </a:solidFill>
               </a:rPr>
-              <a:t>Standalone</a:t>
-            </a:r>
-          </a:p>
-        </p:txBody>
-      </p:sp>
-      <p:sp>
-        <p:nvSpPr>
-          <p:cNvPr id="5" name="ZoneTexte 4">
-            <a:extLst>
-              <a:ext uri="{FF2B5EF4-FFF2-40B4-BE49-F238E27FC236}">
-                <a16:creationId xmlns:a16="http://schemas.microsoft.com/office/drawing/2014/main" id="{EEBB01C4-BB68-CC4E-AC08-79B4D5C385CD}"/>
-              </a:ext>
-            </a:extLst>
-          </p:cNvPr>
-          <p:cNvSpPr txBox="1"/>
-          <p:nvPr/>
-        </p:nvSpPr>
-        <p:spPr>
-          <a:xfrm>
-            <a:off x="282573" y="1887786"/>
-            <a:ext cx="1716832" cy="276999"/>
-          </a:xfrm>
-          <a:prstGeom prst="rect">
-            <a:avLst/>
-          </a:prstGeom>
-          <a:noFill/>
-        </p:spPr>
-        <p:txBody>
-          <a:bodyPr wrap="square" rtlCol="0">
-            <a:spAutoFit/>
-          </a:bodyPr>
-          <a:lstStyle/>
-          <a:p>
-            <a:r>
-              <a:rPr lang="fr-FR" sz="1200" dirty="0">
-                <a:solidFill>
-                  <a:schemeClr val="bg1"/>
-                </a:solidFill>
-              </a:rPr>
-              <a:t>Contrôle-Flow</a:t>
-            </a:r>
-          </a:p>
-        </p:txBody>
-      </p:sp>
-      <p:sp>
-        <p:nvSpPr>
-          <p:cNvPr id="6" name="ZoneTexte 5">
-            <a:extLst>
-              <a:ext uri="{FF2B5EF4-FFF2-40B4-BE49-F238E27FC236}">
-                <a16:creationId xmlns:a16="http://schemas.microsoft.com/office/drawing/2014/main" id="{515448ED-22A9-FCEE-4DA6-EF1B64570B58}"/>
-              </a:ext>
-            </a:extLst>
-          </p:cNvPr>
-          <p:cNvSpPr txBox="1"/>
-          <p:nvPr/>
-        </p:nvSpPr>
-        <p:spPr>
-          <a:xfrm>
-            <a:off x="282573" y="2225735"/>
-            <a:ext cx="1716832" cy="276999"/>
-          </a:xfrm>
-          <a:prstGeom prst="rect">
-            <a:avLst/>
-          </a:prstGeom>
-          <a:noFill/>
-        </p:spPr>
-        <p:txBody>
-          <a:bodyPr wrap="square" rtlCol="0">
-            <a:spAutoFit/>
-          </a:bodyPr>
-          <a:lstStyle/>
-          <a:p>
-            <a:r>
-              <a:rPr lang="fr-FR" sz="1200" dirty="0">
-                <a:solidFill>
-                  <a:schemeClr val="bg1"/>
-                </a:solidFill>
-              </a:rPr>
-              <a:t>Formulaires Typés</a:t>
-            </a:r>
-          </a:p>
-        </p:txBody>
-      </p:sp>
-      <p:sp>
-        <p:nvSpPr>
-          <p:cNvPr id="9" name="ZoneTexte 8">
-            <a:extLst>
-              <a:ext uri="{FF2B5EF4-FFF2-40B4-BE49-F238E27FC236}">
-                <a16:creationId xmlns:a16="http://schemas.microsoft.com/office/drawing/2014/main" id="{339A8152-39A9-1BA4-27D4-A29A11695A8F}"/>
-              </a:ext>
-            </a:extLst>
-          </p:cNvPr>
-          <p:cNvSpPr txBox="1"/>
-          <p:nvPr/>
-        </p:nvSpPr>
-        <p:spPr>
-          <a:xfrm>
-            <a:off x="2470775" y="34803"/>
-            <a:ext cx="3344809" cy="646331"/>
-          </a:xfrm>
-          <a:prstGeom prst="rect">
-            <a:avLst/>
-          </a:prstGeom>
-          <a:noFill/>
-        </p:spPr>
-        <p:txBody>
-          <a:bodyPr wrap="square" rtlCol="0">
-            <a:spAutoFit/>
-          </a:bodyPr>
-          <a:lstStyle/>
-          <a:p>
-            <a:r>
-              <a:rPr lang="fr-FR" sz="3600" dirty="0"/>
-              <a:t>Standalone</a:t>
+              <a:t>Conclusion</a:t>
             </a:r>
           </a:p>
         </p:txBody>
       </p:sp>
       <p:pic>
         <p:nvPicPr>
-          <p:cNvPr id="11" name="Image 10">
-            <a:extLst>
-              <a:ext uri="{FF2B5EF4-FFF2-40B4-BE49-F238E27FC236}">
-                <a16:creationId xmlns:a16="http://schemas.microsoft.com/office/drawing/2014/main" id="{562B0F2D-7F2C-827C-564B-22955B16EEAB}"/>
+          <p:cNvPr id="6" name="Image 5">
+            <a:extLst>
+              <a:ext uri="{FF2B5EF4-FFF2-40B4-BE49-F238E27FC236}">
+                <a16:creationId xmlns:a16="http://schemas.microsoft.com/office/drawing/2014/main" id="{7BA6CB53-9ECB-C913-117C-7B7301939BF7}"/>
               </a:ext>
             </a:extLst>
           </p:cNvPr>
@@ -11921,416 +10517,25 @@
           <p:nvPr/>
         </p:nvPicPr>
         <p:blipFill>
-          <a:blip r:embed="rId4"/>
+          <a:blip r:embed="rId3"/>
           <a:stretch>
             <a:fillRect/>
           </a:stretch>
         </p:blipFill>
         <p:spPr>
           <a:xfrm>
-            <a:off x="3638432" y="2080363"/>
-            <a:ext cx="8267700" cy="1756907"/>
+            <a:off x="2209800" y="489098"/>
+            <a:ext cx="7772400" cy="2430195"/>
           </a:xfrm>
           <a:prstGeom prst="rect">
             <a:avLst/>
           </a:prstGeom>
         </p:spPr>
       </p:pic>
-      <p:pic>
-        <p:nvPicPr>
-          <p:cNvPr id="13" name="Image 12">
-            <a:extLst>
-              <a:ext uri="{FF2B5EF4-FFF2-40B4-BE49-F238E27FC236}">
-                <a16:creationId xmlns:a16="http://schemas.microsoft.com/office/drawing/2014/main" id="{770EF678-CDEF-07BF-855A-B415758A9BE8}"/>
-              </a:ext>
-            </a:extLst>
-          </p:cNvPr>
-          <p:cNvPicPr>
-            <a:picLocks noChangeAspect="1"/>
-          </p:cNvPicPr>
-          <p:nvPr/>
-        </p:nvPicPr>
-        <p:blipFill>
-          <a:blip r:embed="rId5"/>
-          <a:stretch>
-            <a:fillRect/>
-          </a:stretch>
-        </p:blipFill>
-        <p:spPr>
-          <a:xfrm>
-            <a:off x="4417921" y="603994"/>
-            <a:ext cx="7488211" cy="1206653"/>
-          </a:xfrm>
-          <a:prstGeom prst="rect">
-            <a:avLst/>
-          </a:prstGeom>
-        </p:spPr>
-      </p:pic>
-      <p:sp>
-        <p:nvSpPr>
-          <p:cNvPr id="2" name="ZoneTexte 1">
-            <a:extLst>
-              <a:ext uri="{FF2B5EF4-FFF2-40B4-BE49-F238E27FC236}">
-                <a16:creationId xmlns:a16="http://schemas.microsoft.com/office/drawing/2014/main" id="{8E3685C9-F2FA-BE7C-5F57-491ADFCDC65C}"/>
-              </a:ext>
-            </a:extLst>
-          </p:cNvPr>
-          <p:cNvSpPr txBox="1"/>
-          <p:nvPr/>
-        </p:nvSpPr>
-        <p:spPr>
-          <a:xfrm>
-            <a:off x="2495030" y="687544"/>
-            <a:ext cx="1804296" cy="923330"/>
-          </a:xfrm>
-          <a:prstGeom prst="rect">
-            <a:avLst/>
-          </a:prstGeom>
-          <a:noFill/>
-        </p:spPr>
-        <p:txBody>
-          <a:bodyPr wrap="square" rtlCol="0">
-            <a:spAutoFit/>
-          </a:bodyPr>
-          <a:lstStyle/>
-          <a:p>
-            <a:r>
-              <a:rPr lang="fr-FR" dirty="0"/>
-              <a:t>Les composants:</a:t>
-            </a:r>
-            <a:br>
-              <a:rPr lang="fr-FR" dirty="0"/>
-            </a:br>
-            <a:r>
-              <a:rPr lang="fr-FR" dirty="0"/>
-              <a:t>Importer tout ce qu’on utilise</a:t>
-            </a:r>
-          </a:p>
-        </p:txBody>
-      </p:sp>
-      <p:sp>
-        <p:nvSpPr>
-          <p:cNvPr id="4" name="ZoneTexte 3">
-            <a:extLst>
-              <a:ext uri="{FF2B5EF4-FFF2-40B4-BE49-F238E27FC236}">
-                <a16:creationId xmlns:a16="http://schemas.microsoft.com/office/drawing/2014/main" id="{724F7D9E-28D4-37FA-D026-5087A3C2D32D}"/>
-              </a:ext>
-            </a:extLst>
-          </p:cNvPr>
-          <p:cNvSpPr txBox="1"/>
-          <p:nvPr/>
-        </p:nvSpPr>
-        <p:spPr>
-          <a:xfrm>
-            <a:off x="2376435" y="2204471"/>
-            <a:ext cx="1804296" cy="923330"/>
-          </a:xfrm>
-          <a:prstGeom prst="rect">
-            <a:avLst/>
-          </a:prstGeom>
-          <a:noFill/>
-        </p:spPr>
-        <p:txBody>
-          <a:bodyPr wrap="square" rtlCol="0">
-            <a:spAutoFit/>
-          </a:bodyPr>
-          <a:lstStyle/>
-          <a:p>
-            <a:r>
-              <a:rPr lang="fr-FR" dirty="0"/>
-              <a:t>Les </a:t>
-            </a:r>
-            <a:r>
-              <a:rPr lang="fr-FR" dirty="0" err="1"/>
-              <a:t>routers</a:t>
-            </a:r>
-            <a:r>
-              <a:rPr lang="fr-FR" dirty="0"/>
-              <a:t>:</a:t>
-            </a:r>
-            <a:br>
-              <a:rPr lang="fr-FR" dirty="0"/>
-            </a:br>
-            <a:r>
-              <a:rPr lang="fr-FR" dirty="0"/>
-              <a:t>changer l’écriture</a:t>
-            </a:r>
-          </a:p>
-        </p:txBody>
-      </p:sp>
-      <p:sp>
-        <p:nvSpPr>
-          <p:cNvPr id="8" name="ZoneTexte 7">
-            <a:extLst>
-              <a:ext uri="{FF2B5EF4-FFF2-40B4-BE49-F238E27FC236}">
-                <a16:creationId xmlns:a16="http://schemas.microsoft.com/office/drawing/2014/main" id="{D11511D4-6145-2AF7-B5F2-97786D8EA9A6}"/>
-              </a:ext>
-            </a:extLst>
-          </p:cNvPr>
-          <p:cNvSpPr txBox="1"/>
-          <p:nvPr/>
-        </p:nvSpPr>
-        <p:spPr>
-          <a:xfrm>
-            <a:off x="2495030" y="4822590"/>
-            <a:ext cx="1804296" cy="369332"/>
-          </a:xfrm>
-          <a:prstGeom prst="rect">
-            <a:avLst/>
-          </a:prstGeom>
-          <a:noFill/>
-        </p:spPr>
-        <p:txBody>
-          <a:bodyPr wrap="square" rtlCol="0">
-            <a:spAutoFit/>
-          </a:bodyPr>
-          <a:lstStyle/>
-          <a:p>
-            <a:r>
-              <a:rPr lang="fr-FR" dirty="0"/>
-              <a:t>Le </a:t>
-            </a:r>
-            <a:r>
-              <a:rPr lang="fr-FR" dirty="0" err="1"/>
-              <a:t>main.ts</a:t>
-            </a:r>
-            <a:endParaRPr lang="fr-FR" dirty="0"/>
-          </a:p>
-        </p:txBody>
-      </p:sp>
-      <p:sp>
-        <p:nvSpPr>
-          <p:cNvPr id="12" name="ZoneTexte 11">
-            <a:extLst>
-              <a:ext uri="{FF2B5EF4-FFF2-40B4-BE49-F238E27FC236}">
-                <a16:creationId xmlns:a16="http://schemas.microsoft.com/office/drawing/2014/main" id="{9CFC8609-870C-DF69-30FE-C84A0EADA26E}"/>
-              </a:ext>
-            </a:extLst>
-          </p:cNvPr>
-          <p:cNvSpPr txBox="1"/>
-          <p:nvPr/>
-        </p:nvSpPr>
-        <p:spPr>
-          <a:xfrm>
-            <a:off x="3768330" y="1823913"/>
-            <a:ext cx="8267700" cy="261610"/>
-          </a:xfrm>
-          <a:prstGeom prst="rect">
-            <a:avLst/>
-          </a:prstGeom>
-          <a:noFill/>
-        </p:spPr>
-        <p:txBody>
-          <a:bodyPr wrap="square" rtlCol="0">
-            <a:spAutoFit/>
-          </a:bodyPr>
-          <a:lstStyle/>
-          <a:p>
-            <a:r>
-              <a:rPr lang="fr-FR" sz="1100" dirty="0"/>
-              <a:t>Autres </a:t>
-            </a:r>
-            <a:r>
-              <a:rPr lang="fr-FR" sz="1100" u="sng" dirty="0"/>
-              <a:t>exemples</a:t>
-            </a:r>
-            <a:r>
-              <a:rPr lang="fr-FR" sz="1100" dirty="0"/>
-              <a:t> d’imports: </a:t>
-            </a:r>
-            <a:r>
-              <a:rPr lang="fr-FR" sz="1100" dirty="0" err="1"/>
-              <a:t>MatIcon</a:t>
-            </a:r>
-            <a:r>
-              <a:rPr lang="fr-FR" sz="1100" dirty="0"/>
-              <a:t>, V1Component, </a:t>
-            </a:r>
-            <a:r>
-              <a:rPr lang="fr-FR" sz="1100" dirty="0" err="1"/>
-              <a:t>ReactiveFormsModule</a:t>
-            </a:r>
-            <a:r>
-              <a:rPr lang="fr-FR" sz="1100" dirty="0"/>
-              <a:t>, </a:t>
-            </a:r>
-            <a:r>
-              <a:rPr lang="fr-FR" sz="1100" dirty="0" err="1"/>
-              <a:t>AsyncPipe</a:t>
-            </a:r>
-            <a:r>
-              <a:rPr lang="fr-FR" sz="1100" dirty="0"/>
-              <a:t>, </a:t>
-            </a:r>
-            <a:r>
-              <a:rPr lang="fr-FR" sz="1100" dirty="0" err="1"/>
-              <a:t>NgSwitchCase</a:t>
-            </a:r>
-            <a:r>
-              <a:rPr lang="fr-FR" sz="1100" dirty="0"/>
-              <a:t>, </a:t>
-            </a:r>
-            <a:r>
-              <a:rPr lang="fr-FR" sz="1100" dirty="0" err="1"/>
-              <a:t>MatButton</a:t>
-            </a:r>
-            <a:r>
-              <a:rPr lang="fr-FR" sz="1100" dirty="0"/>
-              <a:t>, </a:t>
-            </a:r>
-            <a:r>
-              <a:rPr lang="fr-FR" sz="1100" dirty="0" err="1"/>
-              <a:t>MatSelect</a:t>
-            </a:r>
-            <a:r>
-              <a:rPr lang="fr-FR" sz="1100" dirty="0"/>
-              <a:t>, </a:t>
-            </a:r>
-            <a:r>
-              <a:rPr lang="fr-FR" sz="1100" dirty="0" err="1"/>
-              <a:t>MatLabel</a:t>
-            </a:r>
-            <a:r>
-              <a:rPr lang="fr-FR" sz="1100" dirty="0"/>
-              <a:t> … </a:t>
-            </a:r>
-          </a:p>
-        </p:txBody>
-      </p:sp>
-      <p:pic>
-        <p:nvPicPr>
-          <p:cNvPr id="17" name="Image 16">
-            <a:extLst>
-              <a:ext uri="{FF2B5EF4-FFF2-40B4-BE49-F238E27FC236}">
-                <a16:creationId xmlns:a16="http://schemas.microsoft.com/office/drawing/2014/main" id="{38A775BC-DA33-2DFE-BC62-089CC9CDFDD4}"/>
-              </a:ext>
-            </a:extLst>
-          </p:cNvPr>
-          <p:cNvPicPr>
-            <a:picLocks noChangeAspect="1"/>
-          </p:cNvPicPr>
-          <p:nvPr/>
-        </p:nvPicPr>
-        <p:blipFill>
-          <a:blip r:embed="rId6"/>
-          <a:stretch>
-            <a:fillRect/>
-          </a:stretch>
-        </p:blipFill>
-        <p:spPr>
-          <a:xfrm>
-            <a:off x="2587456" y="3916585"/>
-            <a:ext cx="9477375" cy="561975"/>
-          </a:xfrm>
-          <a:prstGeom prst="rect">
-            <a:avLst/>
-          </a:prstGeom>
-        </p:spPr>
-      </p:pic>
-      <p:pic>
-        <p:nvPicPr>
-          <p:cNvPr id="19" name="Image 18">
-            <a:extLst>
-              <a:ext uri="{FF2B5EF4-FFF2-40B4-BE49-F238E27FC236}">
-                <a16:creationId xmlns:a16="http://schemas.microsoft.com/office/drawing/2014/main" id="{4FBDC1D5-3E58-4E88-1AEF-36DAC828D0A1}"/>
-              </a:ext>
-            </a:extLst>
-          </p:cNvPr>
-          <p:cNvPicPr>
-            <a:picLocks noChangeAspect="1"/>
-          </p:cNvPicPr>
-          <p:nvPr/>
-        </p:nvPicPr>
-        <p:blipFill>
-          <a:blip r:embed="rId7"/>
-          <a:stretch>
-            <a:fillRect/>
-          </a:stretch>
-        </p:blipFill>
-        <p:spPr>
-          <a:xfrm>
-            <a:off x="3292625" y="5315636"/>
-            <a:ext cx="4479657" cy="257822"/>
-          </a:xfrm>
-          <a:prstGeom prst="rect">
-            <a:avLst/>
-          </a:prstGeom>
-        </p:spPr>
-      </p:pic>
-      <p:pic>
-        <p:nvPicPr>
-          <p:cNvPr id="21" name="Image 20">
-            <a:extLst>
-              <a:ext uri="{FF2B5EF4-FFF2-40B4-BE49-F238E27FC236}">
-                <a16:creationId xmlns:a16="http://schemas.microsoft.com/office/drawing/2014/main" id="{87B6E234-E63F-1D10-41D9-43E2ED19F21C}"/>
-              </a:ext>
-            </a:extLst>
-          </p:cNvPr>
-          <p:cNvPicPr>
-            <a:picLocks noChangeAspect="1"/>
-          </p:cNvPicPr>
-          <p:nvPr/>
-        </p:nvPicPr>
-        <p:blipFill>
-          <a:blip r:embed="rId8"/>
-          <a:stretch>
-            <a:fillRect/>
-          </a:stretch>
-        </p:blipFill>
-        <p:spPr>
-          <a:xfrm>
-            <a:off x="7964424" y="4822590"/>
-            <a:ext cx="3446002" cy="1278356"/>
-          </a:xfrm>
-          <a:prstGeom prst="rect">
-            <a:avLst/>
-          </a:prstGeom>
-        </p:spPr>
-      </p:pic>
-      <p:sp>
-        <p:nvSpPr>
-          <p:cNvPr id="22" name="ZoneTexte 21">
-            <a:extLst>
-              <a:ext uri="{FF2B5EF4-FFF2-40B4-BE49-F238E27FC236}">
-                <a16:creationId xmlns:a16="http://schemas.microsoft.com/office/drawing/2014/main" id="{81B69840-82A2-3097-6574-47FC5EDFBC67}"/>
-              </a:ext>
-            </a:extLst>
-          </p:cNvPr>
-          <p:cNvSpPr txBox="1"/>
-          <p:nvPr/>
-        </p:nvSpPr>
-        <p:spPr>
-          <a:xfrm>
-            <a:off x="2679192" y="6254496"/>
-            <a:ext cx="8196475" cy="369332"/>
-          </a:xfrm>
-          <a:prstGeom prst="rect">
-            <a:avLst/>
-          </a:prstGeom>
-          <a:noFill/>
-        </p:spPr>
-        <p:txBody>
-          <a:bodyPr wrap="none" rtlCol="0">
-            <a:spAutoFit/>
-          </a:bodyPr>
-          <a:lstStyle/>
-          <a:p>
-            <a:r>
-              <a:rPr lang="fr-FR" dirty="0"/>
-              <a:t>Et normalement, vous ne devriez plus avoir grand-chose dans vos fichiers *.</a:t>
-            </a:r>
-            <a:r>
-              <a:rPr lang="fr-FR" dirty="0" err="1"/>
-              <a:t>module.ts</a:t>
-            </a:r>
-            <a:endParaRPr lang="fr-FR" dirty="0"/>
-          </a:p>
-        </p:txBody>
-      </p:sp>
     </p:spTree>
     <p:extLst>
       <p:ext uri="{BB962C8B-B14F-4D97-AF65-F5344CB8AC3E}">
-        <p14:creationId xmlns:p14="http://schemas.microsoft.com/office/powerpoint/2010/main" val="3022721655"/>
+        <p14:creationId xmlns:p14="http://schemas.microsoft.com/office/powerpoint/2010/main" val="3253818937"/>
       </p:ext>
     </p:extLst>
   </p:cSld>
@@ -12360,7 +10565,7 @@
         <p:cNvPr id="1" name="">
           <a:extLst>
             <a:ext uri="{FF2B5EF4-FFF2-40B4-BE49-F238E27FC236}">
-              <a16:creationId xmlns:a16="http://schemas.microsoft.com/office/drawing/2014/main" id="{5DB274A6-3E95-EFAC-5DAE-85B11C3D9326}"/>
+              <a16:creationId xmlns:a16="http://schemas.microsoft.com/office/drawing/2014/main" id="{C71D6E6C-E82E-5903-5BFA-47B455C7DCA3}"/>
             </a:ext>
           </a:extLst>
         </p:cNvPr>
@@ -12377,45 +10582,10 @@
       </p:grpSpPr>
       <p:sp>
         <p:nvSpPr>
-          <p:cNvPr id="37" name="ZoneTexte 36">
-            <a:extLst>
-              <a:ext uri="{FF2B5EF4-FFF2-40B4-BE49-F238E27FC236}">
-                <a16:creationId xmlns:a16="http://schemas.microsoft.com/office/drawing/2014/main" id="{569106AD-D5B4-9594-CEBE-AC57797A5D1A}"/>
-              </a:ext>
-            </a:extLst>
-          </p:cNvPr>
-          <p:cNvSpPr txBox="1"/>
-          <p:nvPr/>
-        </p:nvSpPr>
-        <p:spPr>
-          <a:xfrm>
-            <a:off x="8847191" y="34803"/>
-            <a:ext cx="3344809" cy="646331"/>
-          </a:xfrm>
-          <a:prstGeom prst="rect">
-            <a:avLst/>
-          </a:prstGeom>
-          <a:noFill/>
-        </p:spPr>
-        <p:txBody>
-          <a:bodyPr wrap="square" rtlCol="0">
-            <a:spAutoFit/>
-          </a:bodyPr>
-          <a:lstStyle/>
-          <a:p>
-            <a:r>
-              <a:rPr lang="fr-FR" sz="3600" dirty="0"/>
-              <a:t>Trucs et astuces</a:t>
-            </a:r>
-          </a:p>
-        </p:txBody>
-      </p:sp>
-      <p:sp>
-        <p:nvSpPr>
           <p:cNvPr id="53" name="Forme libre 52">
             <a:extLst>
               <a:ext uri="{FF2B5EF4-FFF2-40B4-BE49-F238E27FC236}">
-                <a16:creationId xmlns:a16="http://schemas.microsoft.com/office/drawing/2014/main" id="{9ABE298F-8A73-D8AF-A7AE-80A0FBFA4B0F}"/>
+                <a16:creationId xmlns:a16="http://schemas.microsoft.com/office/drawing/2014/main" id="{D8B2147D-1787-A166-FC41-CBB71DFBC6DA}"/>
               </a:ext>
             </a:extLst>
           </p:cNvPr>
@@ -12425,7 +10595,7 @@
         <p:spPr>
           <a:xfrm>
             <a:off x="0" y="0"/>
-            <a:ext cx="2376435" cy="6858000"/>
+            <a:ext cx="12192000" cy="6858000"/>
           </a:xfrm>
           <a:custGeom>
             <a:avLst/>
@@ -12549,138 +10719,10 @@
       </p:sp>
       <p:sp>
         <p:nvSpPr>
-          <p:cNvPr id="48" name="Forme libre 47">
-            <a:extLst>
-              <a:ext uri="{FF2B5EF4-FFF2-40B4-BE49-F238E27FC236}">
-                <a16:creationId xmlns:a16="http://schemas.microsoft.com/office/drawing/2014/main" id="{04123F1C-9F0E-CBF4-4A63-7A181DFC50D6}"/>
-              </a:ext>
-            </a:extLst>
-          </p:cNvPr>
-          <p:cNvSpPr/>
-          <p:nvPr/>
-        </p:nvSpPr>
-        <p:spPr>
-          <a:xfrm>
-            <a:off x="0" y="1357569"/>
-            <a:ext cx="330200" cy="660400"/>
-          </a:xfrm>
-          <a:custGeom>
-            <a:avLst/>
-            <a:gdLst>
-              <a:gd name="connsiteX0" fmla="*/ 0 w 330200"/>
-              <a:gd name="connsiteY0" fmla="*/ 0 h 660400"/>
-              <a:gd name="connsiteX1" fmla="*/ 330200 w 330200"/>
-              <a:gd name="connsiteY1" fmla="*/ 330200 h 660400"/>
-              <a:gd name="connsiteX2" fmla="*/ 0 w 330200"/>
-              <a:gd name="connsiteY2" fmla="*/ 660400 h 660400"/>
-              <a:gd name="connsiteX3" fmla="*/ 0 w 330200"/>
-              <a:gd name="connsiteY3" fmla="*/ 0 h 660400"/>
-            </a:gdLst>
-            <a:ahLst/>
-            <a:cxnLst>
-              <a:cxn ang="0">
-                <a:pos x="connsiteX0" y="connsiteY0"/>
-              </a:cxn>
-              <a:cxn ang="0">
-                <a:pos x="connsiteX1" y="connsiteY1"/>
-              </a:cxn>
-              <a:cxn ang="0">
-                <a:pos x="connsiteX2" y="connsiteY2"/>
-              </a:cxn>
-              <a:cxn ang="0">
-                <a:pos x="connsiteX3" y="connsiteY3"/>
-              </a:cxn>
-            </a:cxnLst>
-            <a:rect l="l" t="t" r="r" b="b"/>
-            <a:pathLst>
-              <a:path w="330200" h="660400">
-                <a:moveTo>
-                  <a:pt x="0" y="0"/>
-                </a:moveTo>
-                <a:cubicBezTo>
-                  <a:pt x="182364" y="0"/>
-                  <a:pt x="330200" y="147836"/>
-                  <a:pt x="330200" y="330200"/>
-                </a:cubicBezTo>
-                <a:cubicBezTo>
-                  <a:pt x="330200" y="512564"/>
-                  <a:pt x="182364" y="660400"/>
-                  <a:pt x="0" y="660400"/>
-                </a:cubicBezTo>
-                <a:lnTo>
-                  <a:pt x="0" y="0"/>
-                </a:lnTo>
-                <a:close/>
-              </a:path>
-            </a:pathLst>
-          </a:custGeom>
-          <a:solidFill>
-            <a:srgbClr val="F3103A"/>
-          </a:solidFill>
-          <a:ln>
-            <a:noFill/>
-          </a:ln>
-        </p:spPr>
-        <p:style>
-          <a:lnRef idx="0">
-            <a:scrgbClr r="0" g="0" b="0"/>
-          </a:lnRef>
-          <a:fillRef idx="0">
-            <a:scrgbClr r="0" g="0" b="0"/>
-          </a:fillRef>
-          <a:effectRef idx="0">
-            <a:scrgbClr r="0" g="0" b="0"/>
-          </a:effectRef>
-          <a:fontRef idx="minor">
-            <a:schemeClr val="lt1"/>
-          </a:fontRef>
-        </p:style>
-        <p:txBody>
-          <a:bodyPr wrap="square" rtlCol="0" anchor="ctr">
-            <a:noAutofit/>
-          </a:bodyPr>
-          <a:lstStyle/>
-          <a:p>
-            <a:pPr algn="ctr"/>
-            <a:endParaRPr lang="fr-FR"/>
-          </a:p>
-        </p:txBody>
-      </p:sp>
-      <p:pic>
-        <p:nvPicPr>
-          <p:cNvPr id="16" name="Image 15">
-            <a:extLst>
-              <a:ext uri="{FF2B5EF4-FFF2-40B4-BE49-F238E27FC236}">
-                <a16:creationId xmlns:a16="http://schemas.microsoft.com/office/drawing/2014/main" id="{4FABDB84-8B29-DABB-5D64-4F4597C89DCF}"/>
-              </a:ext>
-            </a:extLst>
-          </p:cNvPr>
-          <p:cNvPicPr>
-            <a:picLocks noChangeAspect="1"/>
-          </p:cNvPicPr>
-          <p:nvPr/>
-        </p:nvPicPr>
-        <p:blipFill rotWithShape="1">
-          <a:blip r:embed="rId3"/>
-          <a:srcRect r="72930"/>
-          <a:stretch/>
-        </p:blipFill>
-        <p:spPr>
-          <a:xfrm>
-            <a:off x="637278" y="130629"/>
-            <a:ext cx="1101877" cy="1272695"/>
-          </a:xfrm>
-          <a:prstGeom prst="rect">
-            <a:avLst/>
-          </a:prstGeom>
-        </p:spPr>
-      </p:pic>
-      <p:sp>
-        <p:nvSpPr>
-          <p:cNvPr id="3" name="ZoneTexte 2">
-            <a:extLst>
-              <a:ext uri="{FF2B5EF4-FFF2-40B4-BE49-F238E27FC236}">
-                <a16:creationId xmlns:a16="http://schemas.microsoft.com/office/drawing/2014/main" id="{504EE855-C499-E5A1-1EF9-11F69982DFBE}"/>
+          <p:cNvPr id="37" name="ZoneTexte 36">
+            <a:extLst>
+              <a:ext uri="{FF2B5EF4-FFF2-40B4-BE49-F238E27FC236}">
+                <a16:creationId xmlns:a16="http://schemas.microsoft.com/office/drawing/2014/main" id="{724392C2-A484-587A-8ABC-2345136F15D6}"/>
               </a:ext>
             </a:extLst>
           </p:cNvPr>
@@ -12689,8 +10731,8 @@
         </p:nvSpPr>
         <p:spPr>
           <a:xfrm>
-            <a:off x="282573" y="1487676"/>
-            <a:ext cx="1716832" cy="400110"/>
+            <a:off x="2629367" y="4130767"/>
+            <a:ext cx="6933267" cy="769441"/>
           </a:xfrm>
           <a:prstGeom prst="rect">
             <a:avLst/>
@@ -12703,195 +10745,24 @@
           </a:bodyPr>
           <a:lstStyle/>
           <a:p>
-            <a:r>
-              <a:rPr lang="fr-FR" sz="2000" dirty="0">
+            <a:pPr algn="ctr"/>
+            <a:r>
+              <a:rPr lang="fr-FR" sz="4400" dirty="0">
                 <a:solidFill>
                   <a:schemeClr val="bg1"/>
                 </a:solidFill>
               </a:rPr>
-              <a:t>Standalone</a:t>
-            </a:r>
-          </a:p>
-        </p:txBody>
-      </p:sp>
-      <p:sp>
-        <p:nvSpPr>
-          <p:cNvPr id="5" name="ZoneTexte 4">
-            <a:extLst>
-              <a:ext uri="{FF2B5EF4-FFF2-40B4-BE49-F238E27FC236}">
-                <a16:creationId xmlns:a16="http://schemas.microsoft.com/office/drawing/2014/main" id="{33693DFE-C66E-5D89-C6AF-076E526B8FD7}"/>
-              </a:ext>
-            </a:extLst>
-          </p:cNvPr>
-          <p:cNvSpPr txBox="1"/>
-          <p:nvPr/>
-        </p:nvSpPr>
-        <p:spPr>
-          <a:xfrm>
-            <a:off x="282573" y="1887786"/>
-            <a:ext cx="1716832" cy="276999"/>
-          </a:xfrm>
-          <a:prstGeom prst="rect">
-            <a:avLst/>
-          </a:prstGeom>
-          <a:noFill/>
-        </p:spPr>
-        <p:txBody>
-          <a:bodyPr wrap="square" rtlCol="0">
-            <a:spAutoFit/>
-          </a:bodyPr>
-          <a:lstStyle/>
-          <a:p>
-            <a:r>
-              <a:rPr lang="fr-FR" sz="1200" dirty="0">
-                <a:solidFill>
-                  <a:schemeClr val="bg1"/>
-                </a:solidFill>
-              </a:rPr>
-              <a:t>Control-Flow</a:t>
-            </a:r>
-          </a:p>
-        </p:txBody>
-      </p:sp>
-      <p:sp>
-        <p:nvSpPr>
-          <p:cNvPr id="6" name="ZoneTexte 5">
-            <a:extLst>
-              <a:ext uri="{FF2B5EF4-FFF2-40B4-BE49-F238E27FC236}">
-                <a16:creationId xmlns:a16="http://schemas.microsoft.com/office/drawing/2014/main" id="{29046383-A122-D9AE-3111-46A228784BBA}"/>
-              </a:ext>
-            </a:extLst>
-          </p:cNvPr>
-          <p:cNvSpPr txBox="1"/>
-          <p:nvPr/>
-        </p:nvSpPr>
-        <p:spPr>
-          <a:xfrm>
-            <a:off x="282573" y="2225735"/>
-            <a:ext cx="1716832" cy="276999"/>
-          </a:xfrm>
-          <a:prstGeom prst="rect">
-            <a:avLst/>
-          </a:prstGeom>
-          <a:noFill/>
-        </p:spPr>
-        <p:txBody>
-          <a:bodyPr wrap="square" rtlCol="0">
-            <a:spAutoFit/>
-          </a:bodyPr>
-          <a:lstStyle/>
-          <a:p>
-            <a:r>
-              <a:rPr lang="fr-FR" sz="1200" dirty="0">
-                <a:solidFill>
-                  <a:schemeClr val="bg1"/>
-                </a:solidFill>
-              </a:rPr>
-              <a:t>Formulaires Typés</a:t>
-            </a:r>
-          </a:p>
-        </p:txBody>
-      </p:sp>
-      <p:sp>
-        <p:nvSpPr>
-          <p:cNvPr id="9" name="ZoneTexte 8">
-            <a:extLst>
-              <a:ext uri="{FF2B5EF4-FFF2-40B4-BE49-F238E27FC236}">
-                <a16:creationId xmlns:a16="http://schemas.microsoft.com/office/drawing/2014/main" id="{B2CC36DC-56B2-73BB-8847-28469252C0EC}"/>
-              </a:ext>
-            </a:extLst>
-          </p:cNvPr>
-          <p:cNvSpPr txBox="1"/>
-          <p:nvPr/>
-        </p:nvSpPr>
-        <p:spPr>
-          <a:xfrm>
-            <a:off x="2470775" y="34803"/>
-            <a:ext cx="3344809" cy="646331"/>
-          </a:xfrm>
-          <a:prstGeom prst="rect">
-            <a:avLst/>
-          </a:prstGeom>
-          <a:noFill/>
-        </p:spPr>
-        <p:txBody>
-          <a:bodyPr wrap="square" rtlCol="0">
-            <a:spAutoFit/>
-          </a:bodyPr>
-          <a:lstStyle/>
-          <a:p>
-            <a:r>
-              <a:rPr lang="fr-FR" sz="3600" dirty="0"/>
-              <a:t>Standalone</a:t>
-            </a:r>
-          </a:p>
-        </p:txBody>
-      </p:sp>
-      <p:sp>
-        <p:nvSpPr>
-          <p:cNvPr id="10" name="ZoneTexte 9">
-            <a:extLst>
-              <a:ext uri="{FF2B5EF4-FFF2-40B4-BE49-F238E27FC236}">
-                <a16:creationId xmlns:a16="http://schemas.microsoft.com/office/drawing/2014/main" id="{1A15B63E-C625-AF9D-F213-6EE6F9527E1D}"/>
-              </a:ext>
-            </a:extLst>
-          </p:cNvPr>
-          <p:cNvSpPr txBox="1"/>
-          <p:nvPr/>
-        </p:nvSpPr>
-        <p:spPr>
-          <a:xfrm>
-            <a:off x="5815584" y="1989408"/>
-            <a:ext cx="3187794" cy="369332"/>
-          </a:xfrm>
-          <a:prstGeom prst="rect">
-            <a:avLst/>
-          </a:prstGeom>
-          <a:noFill/>
-        </p:spPr>
-        <p:txBody>
-          <a:bodyPr wrap="square" rtlCol="0">
-            <a:spAutoFit/>
-          </a:bodyPr>
-          <a:lstStyle/>
-          <a:p>
-            <a:r>
-              <a:rPr lang="fr-FR" dirty="0"/>
-              <a:t>Le </a:t>
-            </a:r>
-            <a:r>
-              <a:rPr lang="fr-FR" b="0" i="0" dirty="0" err="1">
-                <a:solidFill>
-                  <a:srgbClr val="242424"/>
-                </a:solidFill>
-                <a:effectLst/>
-                <a:latin typeface="sohne"/>
-              </a:rPr>
-              <a:t>schematic</a:t>
-            </a:r>
-            <a:r>
-              <a:rPr lang="fr-FR" b="0" i="0" dirty="0">
-                <a:solidFill>
-                  <a:srgbClr val="242424"/>
-                </a:solidFill>
-                <a:effectLst/>
-                <a:latin typeface="sohne"/>
-              </a:rPr>
-              <a:t> le fait très bien</a:t>
-            </a:r>
-            <a:r>
-              <a:rPr lang="fr-FR" dirty="0"/>
-              <a:t> </a:t>
+              <a:t>Merci !</a:t>
             </a:r>
           </a:p>
         </p:txBody>
       </p:sp>
       <p:pic>
         <p:nvPicPr>
-          <p:cNvPr id="15" name="Image 14">
-            <a:extLst>
-              <a:ext uri="{FF2B5EF4-FFF2-40B4-BE49-F238E27FC236}">
-                <a16:creationId xmlns:a16="http://schemas.microsoft.com/office/drawing/2014/main" id="{E0B8CD84-F858-DFF3-03D8-CDAA1FFFE27C}"/>
+          <p:cNvPr id="6" name="Image 5">
+            <a:extLst>
+              <a:ext uri="{FF2B5EF4-FFF2-40B4-BE49-F238E27FC236}">
+                <a16:creationId xmlns:a16="http://schemas.microsoft.com/office/drawing/2014/main" id="{01ECC903-B862-A4B2-F8A4-5D8FC7605713}"/>
               </a:ext>
             </a:extLst>
           </p:cNvPr>
@@ -12901,15 +10772,15 @@
           <p:nvPr/>
         </p:nvPicPr>
         <p:blipFill>
-          <a:blip r:embed="rId4"/>
+          <a:blip r:embed="rId3"/>
           <a:stretch>
             <a:fillRect/>
           </a:stretch>
         </p:blipFill>
         <p:spPr>
           <a:xfrm>
-            <a:off x="5030835" y="4348148"/>
-            <a:ext cx="4443791" cy="520444"/>
+            <a:off x="2209800" y="489098"/>
+            <a:ext cx="7772400" cy="2430195"/>
           </a:xfrm>
           <a:prstGeom prst="rect">
             <a:avLst/>
@@ -12919,557 +10790,7 @@
     </p:spTree>
     <p:extLst>
       <p:ext uri="{BB962C8B-B14F-4D97-AF65-F5344CB8AC3E}">
-        <p14:creationId xmlns:p14="http://schemas.microsoft.com/office/powerpoint/2010/main" val="2150457709"/>
-      </p:ext>
-    </p:extLst>
-  </p:cSld>
-  <p:clrMapOvr>
-    <a:masterClrMapping/>
-  </p:clrMapOvr>
-  <mc:AlternateContent xmlns:mc="http://schemas.openxmlformats.org/markup-compatibility/2006" xmlns:p159="http://schemas.microsoft.com/office/powerpoint/2015/09/main">
-    <mc:Choice Requires="p159">
-      <p:transition spd="slow">
-        <p159:morph option="byObject"/>
-      </p:transition>
-    </mc:Choice>
-    <mc:Fallback xmlns="">
-      <p:transition spd="slow">
-        <p:fade/>
-      </p:transition>
-    </mc:Fallback>
-  </mc:AlternateContent>
-</p:sld>
-</file>
-
-<file path=ppt/slides/slide19.xml><?xml version="1.0" encoding="utf-8"?>
-<p:sld xmlns:a="http://schemas.openxmlformats.org/drawingml/2006/main" xmlns:r="http://schemas.openxmlformats.org/officeDocument/2006/relationships" xmlns:p="http://schemas.openxmlformats.org/presentationml/2006/main">
-  <p:cSld>
-    <p:spTree>
-      <p:nvGrpSpPr>
-        <p:cNvPr id="1" name="">
-          <a:extLst>
-            <a:ext uri="{FF2B5EF4-FFF2-40B4-BE49-F238E27FC236}">
-              <a16:creationId xmlns:a16="http://schemas.microsoft.com/office/drawing/2014/main" id="{6FD2F1F4-A1B4-3318-FEAD-3C73021AB5DF}"/>
-            </a:ext>
-          </a:extLst>
-        </p:cNvPr>
-        <p:cNvGrpSpPr/>
-        <p:nvPr/>
-      </p:nvGrpSpPr>
-      <p:grpSpPr>
-        <a:xfrm>
-          <a:off x="0" y="0"/>
-          <a:ext cx="0" cy="0"/>
-          <a:chOff x="0" y="0"/>
-          <a:chExt cx="0" cy="0"/>
-        </a:xfrm>
-      </p:grpSpPr>
-      <p:sp>
-        <p:nvSpPr>
-          <p:cNvPr id="37" name="ZoneTexte 36">
-            <a:extLst>
-              <a:ext uri="{FF2B5EF4-FFF2-40B4-BE49-F238E27FC236}">
-                <a16:creationId xmlns:a16="http://schemas.microsoft.com/office/drawing/2014/main" id="{3B69AE5A-AFEF-2140-F430-5FFBB92302AD}"/>
-              </a:ext>
-            </a:extLst>
-          </p:cNvPr>
-          <p:cNvSpPr txBox="1"/>
-          <p:nvPr/>
-        </p:nvSpPr>
-        <p:spPr>
-          <a:xfrm>
-            <a:off x="8847191" y="34803"/>
-            <a:ext cx="3344809" cy="646331"/>
-          </a:xfrm>
-          <a:prstGeom prst="rect">
-            <a:avLst/>
-          </a:prstGeom>
-          <a:noFill/>
-        </p:spPr>
-        <p:txBody>
-          <a:bodyPr wrap="square" rtlCol="0">
-            <a:spAutoFit/>
-          </a:bodyPr>
-          <a:lstStyle/>
-          <a:p>
-            <a:r>
-              <a:rPr lang="fr-FR" sz="3600" dirty="0"/>
-              <a:t>Trucs et astuces</a:t>
-            </a:r>
-          </a:p>
-        </p:txBody>
-      </p:sp>
-      <p:sp>
-        <p:nvSpPr>
-          <p:cNvPr id="53" name="Forme libre 52">
-            <a:extLst>
-              <a:ext uri="{FF2B5EF4-FFF2-40B4-BE49-F238E27FC236}">
-                <a16:creationId xmlns:a16="http://schemas.microsoft.com/office/drawing/2014/main" id="{D2C42CC4-DA42-F6BC-D613-06771F374F3C}"/>
-              </a:ext>
-            </a:extLst>
-          </p:cNvPr>
-          <p:cNvSpPr/>
-          <p:nvPr/>
-        </p:nvSpPr>
-        <p:spPr>
-          <a:xfrm>
-            <a:off x="0" y="0"/>
-            <a:ext cx="2376435" cy="6858000"/>
-          </a:xfrm>
-          <a:custGeom>
-            <a:avLst/>
-            <a:gdLst>
-              <a:gd name="connsiteX0" fmla="*/ 0 w 2376435"/>
-              <a:gd name="connsiteY0" fmla="*/ 0 h 6858000"/>
-              <a:gd name="connsiteX1" fmla="*/ 2376435 w 2376435"/>
-              <a:gd name="connsiteY1" fmla="*/ 0 h 6858000"/>
-              <a:gd name="connsiteX2" fmla="*/ 2376435 w 2376435"/>
-              <a:gd name="connsiteY2" fmla="*/ 584200 h 6858000"/>
-              <a:gd name="connsiteX3" fmla="*/ 2376435 w 2376435"/>
-              <a:gd name="connsiteY3" fmla="*/ 1244600 h 6858000"/>
-              <a:gd name="connsiteX4" fmla="*/ 2376435 w 2376435"/>
-              <a:gd name="connsiteY4" fmla="*/ 1650138 h 6858000"/>
-              <a:gd name="connsiteX5" fmla="*/ 2376435 w 2376435"/>
-              <a:gd name="connsiteY5" fmla="*/ 2310538 h 6858000"/>
-              <a:gd name="connsiteX6" fmla="*/ 2376435 w 2376435"/>
-              <a:gd name="connsiteY6" fmla="*/ 2603145 h 6858000"/>
-              <a:gd name="connsiteX7" fmla="*/ 2376435 w 2376435"/>
-              <a:gd name="connsiteY7" fmla="*/ 3263545 h 6858000"/>
-              <a:gd name="connsiteX8" fmla="*/ 2376435 w 2376435"/>
-              <a:gd name="connsiteY8" fmla="*/ 6858000 h 6858000"/>
-              <a:gd name="connsiteX9" fmla="*/ 0 w 2376435"/>
-              <a:gd name="connsiteY9" fmla="*/ 6858000 h 6858000"/>
-            </a:gdLst>
-            <a:ahLst/>
-            <a:cxnLst>
-              <a:cxn ang="0">
-                <a:pos x="connsiteX0" y="connsiteY0"/>
-              </a:cxn>
-              <a:cxn ang="0">
-                <a:pos x="connsiteX1" y="connsiteY1"/>
-              </a:cxn>
-              <a:cxn ang="0">
-                <a:pos x="connsiteX2" y="connsiteY2"/>
-              </a:cxn>
-              <a:cxn ang="0">
-                <a:pos x="connsiteX3" y="connsiteY3"/>
-              </a:cxn>
-              <a:cxn ang="0">
-                <a:pos x="connsiteX4" y="connsiteY4"/>
-              </a:cxn>
-              <a:cxn ang="0">
-                <a:pos x="connsiteX5" y="connsiteY5"/>
-              </a:cxn>
-              <a:cxn ang="0">
-                <a:pos x="connsiteX6" y="connsiteY6"/>
-              </a:cxn>
-              <a:cxn ang="0">
-                <a:pos x="connsiteX7" y="connsiteY7"/>
-              </a:cxn>
-              <a:cxn ang="0">
-                <a:pos x="connsiteX8" y="connsiteY8"/>
-              </a:cxn>
-              <a:cxn ang="0">
-                <a:pos x="connsiteX9" y="connsiteY9"/>
-              </a:cxn>
-            </a:cxnLst>
-            <a:rect l="l" t="t" r="r" b="b"/>
-            <a:pathLst>
-              <a:path w="2376435" h="6858000">
-                <a:moveTo>
-                  <a:pt x="0" y="0"/>
-                </a:moveTo>
-                <a:lnTo>
-                  <a:pt x="2376435" y="0"/>
-                </a:lnTo>
-                <a:lnTo>
-                  <a:pt x="2376435" y="584200"/>
-                </a:lnTo>
-                <a:lnTo>
-                  <a:pt x="2376435" y="1244600"/>
-                </a:lnTo>
-                <a:lnTo>
-                  <a:pt x="2376435" y="1650138"/>
-                </a:lnTo>
-                <a:lnTo>
-                  <a:pt x="2376435" y="2310538"/>
-                </a:lnTo>
-                <a:lnTo>
-                  <a:pt x="2376435" y="2603145"/>
-                </a:lnTo>
-                <a:lnTo>
-                  <a:pt x="2376435" y="3263545"/>
-                </a:lnTo>
-                <a:lnTo>
-                  <a:pt x="2376435" y="6858000"/>
-                </a:lnTo>
-                <a:lnTo>
-                  <a:pt x="0" y="6858000"/>
-                </a:lnTo>
-                <a:close/>
-              </a:path>
-            </a:pathLst>
-          </a:custGeom>
-        </p:spPr>
-        <p:style>
-          <a:lnRef idx="1">
-            <a:schemeClr val="dk1"/>
-          </a:lnRef>
-          <a:fillRef idx="3">
-            <a:schemeClr val="dk1"/>
-          </a:fillRef>
-          <a:effectRef idx="2">
-            <a:schemeClr val="dk1"/>
-          </a:effectRef>
-          <a:fontRef idx="minor">
-            <a:schemeClr val="lt1"/>
-          </a:fontRef>
-        </p:style>
-        <p:txBody>
-          <a:bodyPr wrap="square" rtlCol="0" anchor="ctr">
-            <a:noAutofit/>
-          </a:bodyPr>
-          <a:lstStyle/>
-          <a:p>
-            <a:pPr algn="ctr"/>
-            <a:endParaRPr lang="fr-FR"/>
-          </a:p>
-        </p:txBody>
-      </p:sp>
-      <p:sp>
-        <p:nvSpPr>
-          <p:cNvPr id="48" name="Forme libre 47">
-            <a:extLst>
-              <a:ext uri="{FF2B5EF4-FFF2-40B4-BE49-F238E27FC236}">
-                <a16:creationId xmlns:a16="http://schemas.microsoft.com/office/drawing/2014/main" id="{8EA09BDC-9B42-B202-71D8-2D91E510F02B}"/>
-              </a:ext>
-            </a:extLst>
-          </p:cNvPr>
-          <p:cNvSpPr/>
-          <p:nvPr/>
-        </p:nvSpPr>
-        <p:spPr>
-          <a:xfrm>
-            <a:off x="0" y="1357569"/>
-            <a:ext cx="330200" cy="660400"/>
-          </a:xfrm>
-          <a:custGeom>
-            <a:avLst/>
-            <a:gdLst>
-              <a:gd name="connsiteX0" fmla="*/ 0 w 330200"/>
-              <a:gd name="connsiteY0" fmla="*/ 0 h 660400"/>
-              <a:gd name="connsiteX1" fmla="*/ 330200 w 330200"/>
-              <a:gd name="connsiteY1" fmla="*/ 330200 h 660400"/>
-              <a:gd name="connsiteX2" fmla="*/ 0 w 330200"/>
-              <a:gd name="connsiteY2" fmla="*/ 660400 h 660400"/>
-              <a:gd name="connsiteX3" fmla="*/ 0 w 330200"/>
-              <a:gd name="connsiteY3" fmla="*/ 0 h 660400"/>
-            </a:gdLst>
-            <a:ahLst/>
-            <a:cxnLst>
-              <a:cxn ang="0">
-                <a:pos x="connsiteX0" y="connsiteY0"/>
-              </a:cxn>
-              <a:cxn ang="0">
-                <a:pos x="connsiteX1" y="connsiteY1"/>
-              </a:cxn>
-              <a:cxn ang="0">
-                <a:pos x="connsiteX2" y="connsiteY2"/>
-              </a:cxn>
-              <a:cxn ang="0">
-                <a:pos x="connsiteX3" y="connsiteY3"/>
-              </a:cxn>
-            </a:cxnLst>
-            <a:rect l="l" t="t" r="r" b="b"/>
-            <a:pathLst>
-              <a:path w="330200" h="660400">
-                <a:moveTo>
-                  <a:pt x="0" y="0"/>
-                </a:moveTo>
-                <a:cubicBezTo>
-                  <a:pt x="182364" y="0"/>
-                  <a:pt x="330200" y="147836"/>
-                  <a:pt x="330200" y="330200"/>
-                </a:cubicBezTo>
-                <a:cubicBezTo>
-                  <a:pt x="330200" y="512564"/>
-                  <a:pt x="182364" y="660400"/>
-                  <a:pt x="0" y="660400"/>
-                </a:cubicBezTo>
-                <a:lnTo>
-                  <a:pt x="0" y="0"/>
-                </a:lnTo>
-                <a:close/>
-              </a:path>
-            </a:pathLst>
-          </a:custGeom>
-          <a:solidFill>
-            <a:srgbClr val="F3103A"/>
-          </a:solidFill>
-          <a:ln>
-            <a:noFill/>
-          </a:ln>
-        </p:spPr>
-        <p:style>
-          <a:lnRef idx="0">
-            <a:scrgbClr r="0" g="0" b="0"/>
-          </a:lnRef>
-          <a:fillRef idx="0">
-            <a:scrgbClr r="0" g="0" b="0"/>
-          </a:fillRef>
-          <a:effectRef idx="0">
-            <a:scrgbClr r="0" g="0" b="0"/>
-          </a:effectRef>
-          <a:fontRef idx="minor">
-            <a:schemeClr val="lt1"/>
-          </a:fontRef>
-        </p:style>
-        <p:txBody>
-          <a:bodyPr wrap="square" rtlCol="0" anchor="ctr">
-            <a:noAutofit/>
-          </a:bodyPr>
-          <a:lstStyle/>
-          <a:p>
-            <a:pPr algn="ctr"/>
-            <a:endParaRPr lang="fr-FR"/>
-          </a:p>
-        </p:txBody>
-      </p:sp>
-      <p:pic>
-        <p:nvPicPr>
-          <p:cNvPr id="16" name="Image 15">
-            <a:extLst>
-              <a:ext uri="{FF2B5EF4-FFF2-40B4-BE49-F238E27FC236}">
-                <a16:creationId xmlns:a16="http://schemas.microsoft.com/office/drawing/2014/main" id="{4D601168-B79C-4599-57E6-78ED578B5093}"/>
-              </a:ext>
-            </a:extLst>
-          </p:cNvPr>
-          <p:cNvPicPr>
-            <a:picLocks noChangeAspect="1"/>
-          </p:cNvPicPr>
-          <p:nvPr/>
-        </p:nvPicPr>
-        <p:blipFill rotWithShape="1">
-          <a:blip r:embed="rId3"/>
-          <a:srcRect r="72930"/>
-          <a:stretch/>
-        </p:blipFill>
-        <p:spPr>
-          <a:xfrm>
-            <a:off x="637278" y="130629"/>
-            <a:ext cx="1101877" cy="1272695"/>
-          </a:xfrm>
-          <a:prstGeom prst="rect">
-            <a:avLst/>
-          </a:prstGeom>
-        </p:spPr>
-      </p:pic>
-      <p:sp>
-        <p:nvSpPr>
-          <p:cNvPr id="3" name="ZoneTexte 2">
-            <a:extLst>
-              <a:ext uri="{FF2B5EF4-FFF2-40B4-BE49-F238E27FC236}">
-                <a16:creationId xmlns:a16="http://schemas.microsoft.com/office/drawing/2014/main" id="{95F96CC4-88D0-2C3A-4F1C-A8BCB7644811}"/>
-              </a:ext>
-            </a:extLst>
-          </p:cNvPr>
-          <p:cNvSpPr txBox="1"/>
-          <p:nvPr/>
-        </p:nvSpPr>
-        <p:spPr>
-          <a:xfrm>
-            <a:off x="282573" y="1487676"/>
-            <a:ext cx="1716832" cy="400110"/>
-          </a:xfrm>
-          <a:prstGeom prst="rect">
-            <a:avLst/>
-          </a:prstGeom>
-          <a:noFill/>
-        </p:spPr>
-        <p:txBody>
-          <a:bodyPr wrap="square" rtlCol="0">
-            <a:spAutoFit/>
-          </a:bodyPr>
-          <a:lstStyle/>
-          <a:p>
-            <a:r>
-              <a:rPr lang="fr-FR" sz="2000" dirty="0">
-                <a:solidFill>
-                  <a:schemeClr val="bg1"/>
-                </a:solidFill>
-              </a:rPr>
-              <a:t>Control-Flow</a:t>
-            </a:r>
-          </a:p>
-        </p:txBody>
-      </p:sp>
-      <p:sp>
-        <p:nvSpPr>
-          <p:cNvPr id="6" name="ZoneTexte 5">
-            <a:extLst>
-              <a:ext uri="{FF2B5EF4-FFF2-40B4-BE49-F238E27FC236}">
-                <a16:creationId xmlns:a16="http://schemas.microsoft.com/office/drawing/2014/main" id="{515448ED-22A9-FCEE-4DA6-EF1B64570B58}"/>
-              </a:ext>
-            </a:extLst>
-          </p:cNvPr>
-          <p:cNvSpPr txBox="1"/>
-          <p:nvPr/>
-        </p:nvSpPr>
-        <p:spPr>
-          <a:xfrm>
-            <a:off x="282573" y="1971533"/>
-            <a:ext cx="1716832" cy="276999"/>
-          </a:xfrm>
-          <a:prstGeom prst="rect">
-            <a:avLst/>
-          </a:prstGeom>
-          <a:noFill/>
-        </p:spPr>
-        <p:txBody>
-          <a:bodyPr wrap="square" rtlCol="0">
-            <a:spAutoFit/>
-          </a:bodyPr>
-          <a:lstStyle/>
-          <a:p>
-            <a:r>
-              <a:rPr lang="fr-FR" sz="1200" dirty="0">
-                <a:solidFill>
-                  <a:schemeClr val="bg1"/>
-                </a:solidFill>
-              </a:rPr>
-              <a:t>Formulaires Typés</a:t>
-            </a:r>
-          </a:p>
-        </p:txBody>
-      </p:sp>
-      <p:sp>
-        <p:nvSpPr>
-          <p:cNvPr id="8" name="ZoneTexte 7">
-            <a:extLst>
-              <a:ext uri="{FF2B5EF4-FFF2-40B4-BE49-F238E27FC236}">
-                <a16:creationId xmlns:a16="http://schemas.microsoft.com/office/drawing/2014/main" id="{66B5E832-A7AD-59DA-A7F7-F2964E6E7E5D}"/>
-              </a:ext>
-            </a:extLst>
-          </p:cNvPr>
-          <p:cNvSpPr txBox="1"/>
-          <p:nvPr/>
-        </p:nvSpPr>
-        <p:spPr>
-          <a:xfrm>
-            <a:off x="2470775" y="34803"/>
-            <a:ext cx="3344809" cy="646331"/>
-          </a:xfrm>
-          <a:prstGeom prst="rect">
-            <a:avLst/>
-          </a:prstGeom>
-          <a:noFill/>
-        </p:spPr>
-        <p:txBody>
-          <a:bodyPr wrap="square" rtlCol="0">
-            <a:spAutoFit/>
-          </a:bodyPr>
-          <a:lstStyle/>
-          <a:p>
-            <a:r>
-              <a:rPr lang="fr-FR" sz="3600" dirty="0"/>
-              <a:t>Control-Flow</a:t>
-            </a:r>
-          </a:p>
-        </p:txBody>
-      </p:sp>
-      <p:sp>
-        <p:nvSpPr>
-          <p:cNvPr id="13" name="ZoneTexte 12">
-            <a:extLst>
-              <a:ext uri="{FF2B5EF4-FFF2-40B4-BE49-F238E27FC236}">
-                <a16:creationId xmlns:a16="http://schemas.microsoft.com/office/drawing/2014/main" id="{7C64C7A1-BDE6-6EAE-AC55-FABBA54B31DC}"/>
-              </a:ext>
-            </a:extLst>
-          </p:cNvPr>
-          <p:cNvSpPr txBox="1"/>
-          <p:nvPr/>
-        </p:nvSpPr>
-        <p:spPr>
-          <a:xfrm>
-            <a:off x="5999303" y="1991878"/>
-            <a:ext cx="2959465" cy="369332"/>
-          </a:xfrm>
-          <a:prstGeom prst="rect">
-            <a:avLst/>
-          </a:prstGeom>
-          <a:noFill/>
-        </p:spPr>
-        <p:txBody>
-          <a:bodyPr wrap="none" rtlCol="0">
-            <a:spAutoFit/>
-          </a:bodyPr>
-          <a:lstStyle/>
-          <a:p>
-            <a:r>
-              <a:rPr lang="fr-FR" dirty="0"/>
-              <a:t>Le </a:t>
-            </a:r>
-            <a:r>
-              <a:rPr lang="fr-FR" b="0" i="0" dirty="0" err="1">
-                <a:solidFill>
-                  <a:srgbClr val="242424"/>
-                </a:solidFill>
-                <a:effectLst/>
-                <a:latin typeface="sohne"/>
-              </a:rPr>
-              <a:t>schematic</a:t>
-            </a:r>
-            <a:r>
-              <a:rPr lang="fr-FR" b="0" i="0" dirty="0">
-                <a:solidFill>
-                  <a:srgbClr val="242424"/>
-                </a:solidFill>
-                <a:effectLst/>
-                <a:latin typeface="sohne"/>
-              </a:rPr>
-              <a:t> le fait très bien</a:t>
-            </a:r>
-            <a:r>
-              <a:rPr lang="fr-FR" dirty="0"/>
-              <a:t> </a:t>
-            </a:r>
-          </a:p>
-        </p:txBody>
-      </p:sp>
-      <p:pic>
-        <p:nvPicPr>
-          <p:cNvPr id="4" name="Image 3">
-            <a:extLst>
-              <a:ext uri="{FF2B5EF4-FFF2-40B4-BE49-F238E27FC236}">
-                <a16:creationId xmlns:a16="http://schemas.microsoft.com/office/drawing/2014/main" id="{B51F1EC8-F0F4-E385-3674-690330E72589}"/>
-              </a:ext>
-            </a:extLst>
-          </p:cNvPr>
-          <p:cNvPicPr>
-            <a:picLocks noChangeAspect="1"/>
-          </p:cNvPicPr>
-          <p:nvPr/>
-        </p:nvPicPr>
-        <p:blipFill>
-          <a:blip r:embed="rId4"/>
-          <a:stretch>
-            <a:fillRect/>
-          </a:stretch>
-        </p:blipFill>
-        <p:spPr>
-          <a:xfrm>
-            <a:off x="4988683" y="4353088"/>
-            <a:ext cx="4980706" cy="513034"/>
-          </a:xfrm>
-          <a:prstGeom prst="rect">
-            <a:avLst/>
-          </a:prstGeom>
-        </p:spPr>
-      </p:pic>
-    </p:spTree>
-    <p:extLst>
-      <p:ext uri="{BB962C8B-B14F-4D97-AF65-F5344CB8AC3E}">
-        <p14:creationId xmlns:p14="http://schemas.microsoft.com/office/powerpoint/2010/main" val="1505289827"/>
+        <p14:creationId xmlns:p14="http://schemas.microsoft.com/office/powerpoint/2010/main" val="1437912832"/>
       </p:ext>
     </p:extLst>
   </p:cSld>
@@ -14820,938 +12141,6 @@
     <p:extLst>
       <p:ext uri="{BB962C8B-B14F-4D97-AF65-F5344CB8AC3E}">
         <p14:creationId xmlns:p14="http://schemas.microsoft.com/office/powerpoint/2010/main" val="4242613186"/>
-      </p:ext>
-    </p:extLst>
-  </p:cSld>
-  <p:clrMapOvr>
-    <a:masterClrMapping/>
-  </p:clrMapOvr>
-  <mc:AlternateContent xmlns:mc="http://schemas.openxmlformats.org/markup-compatibility/2006" xmlns:p159="http://schemas.microsoft.com/office/powerpoint/2015/09/main">
-    <mc:Choice Requires="p159">
-      <p:transition spd="slow">
-        <p159:morph option="byObject"/>
-      </p:transition>
-    </mc:Choice>
-    <mc:Fallback xmlns="">
-      <p:transition spd="slow">
-        <p:fade/>
-      </p:transition>
-    </mc:Fallback>
-  </mc:AlternateContent>
-</p:sld>
-</file>
-
-<file path=ppt/slides/slide20.xml><?xml version="1.0" encoding="utf-8"?>
-<p:sld xmlns:a="http://schemas.openxmlformats.org/drawingml/2006/main" xmlns:r="http://schemas.openxmlformats.org/officeDocument/2006/relationships" xmlns:p="http://schemas.openxmlformats.org/presentationml/2006/main">
-  <p:cSld>
-    <p:spTree>
-      <p:nvGrpSpPr>
-        <p:cNvPr id="1" name="">
-          <a:extLst>
-            <a:ext uri="{FF2B5EF4-FFF2-40B4-BE49-F238E27FC236}">
-              <a16:creationId xmlns:a16="http://schemas.microsoft.com/office/drawing/2014/main" id="{88CFDF27-9BCC-627D-2589-7A5096F04793}"/>
-            </a:ext>
-          </a:extLst>
-        </p:cNvPr>
-        <p:cNvGrpSpPr/>
-        <p:nvPr/>
-      </p:nvGrpSpPr>
-      <p:grpSpPr>
-        <a:xfrm>
-          <a:off x="0" y="0"/>
-          <a:ext cx="0" cy="0"/>
-          <a:chOff x="0" y="0"/>
-          <a:chExt cx="0" cy="0"/>
-        </a:xfrm>
-      </p:grpSpPr>
-      <p:sp>
-        <p:nvSpPr>
-          <p:cNvPr id="37" name="ZoneTexte 36">
-            <a:extLst>
-              <a:ext uri="{FF2B5EF4-FFF2-40B4-BE49-F238E27FC236}">
-                <a16:creationId xmlns:a16="http://schemas.microsoft.com/office/drawing/2014/main" id="{27F308A6-3A86-976F-0558-10B03DFCE6EA}"/>
-              </a:ext>
-            </a:extLst>
-          </p:cNvPr>
-          <p:cNvSpPr txBox="1"/>
-          <p:nvPr/>
-        </p:nvSpPr>
-        <p:spPr>
-          <a:xfrm>
-            <a:off x="8847191" y="34803"/>
-            <a:ext cx="3344809" cy="646331"/>
-          </a:xfrm>
-          <a:prstGeom prst="rect">
-            <a:avLst/>
-          </a:prstGeom>
-          <a:noFill/>
-        </p:spPr>
-        <p:txBody>
-          <a:bodyPr wrap="square" rtlCol="0">
-            <a:spAutoFit/>
-          </a:bodyPr>
-          <a:lstStyle/>
-          <a:p>
-            <a:r>
-              <a:rPr lang="fr-FR" sz="3600" dirty="0"/>
-              <a:t>Trucs et astuces</a:t>
-            </a:r>
-          </a:p>
-        </p:txBody>
-      </p:sp>
-      <p:sp>
-        <p:nvSpPr>
-          <p:cNvPr id="53" name="Forme libre 52">
-            <a:extLst>
-              <a:ext uri="{FF2B5EF4-FFF2-40B4-BE49-F238E27FC236}">
-                <a16:creationId xmlns:a16="http://schemas.microsoft.com/office/drawing/2014/main" id="{5C058DD2-457F-8FCE-0362-DEC08981358A}"/>
-              </a:ext>
-            </a:extLst>
-          </p:cNvPr>
-          <p:cNvSpPr/>
-          <p:nvPr/>
-        </p:nvSpPr>
-        <p:spPr>
-          <a:xfrm>
-            <a:off x="0" y="0"/>
-            <a:ext cx="2376435" cy="6858000"/>
-          </a:xfrm>
-          <a:custGeom>
-            <a:avLst/>
-            <a:gdLst>
-              <a:gd name="connsiteX0" fmla="*/ 0 w 2376435"/>
-              <a:gd name="connsiteY0" fmla="*/ 0 h 6858000"/>
-              <a:gd name="connsiteX1" fmla="*/ 2376435 w 2376435"/>
-              <a:gd name="connsiteY1" fmla="*/ 0 h 6858000"/>
-              <a:gd name="connsiteX2" fmla="*/ 2376435 w 2376435"/>
-              <a:gd name="connsiteY2" fmla="*/ 584200 h 6858000"/>
-              <a:gd name="connsiteX3" fmla="*/ 2376435 w 2376435"/>
-              <a:gd name="connsiteY3" fmla="*/ 1244600 h 6858000"/>
-              <a:gd name="connsiteX4" fmla="*/ 2376435 w 2376435"/>
-              <a:gd name="connsiteY4" fmla="*/ 1650138 h 6858000"/>
-              <a:gd name="connsiteX5" fmla="*/ 2376435 w 2376435"/>
-              <a:gd name="connsiteY5" fmla="*/ 2310538 h 6858000"/>
-              <a:gd name="connsiteX6" fmla="*/ 2376435 w 2376435"/>
-              <a:gd name="connsiteY6" fmla="*/ 2603145 h 6858000"/>
-              <a:gd name="connsiteX7" fmla="*/ 2376435 w 2376435"/>
-              <a:gd name="connsiteY7" fmla="*/ 3263545 h 6858000"/>
-              <a:gd name="connsiteX8" fmla="*/ 2376435 w 2376435"/>
-              <a:gd name="connsiteY8" fmla="*/ 6858000 h 6858000"/>
-              <a:gd name="connsiteX9" fmla="*/ 0 w 2376435"/>
-              <a:gd name="connsiteY9" fmla="*/ 6858000 h 6858000"/>
-            </a:gdLst>
-            <a:ahLst/>
-            <a:cxnLst>
-              <a:cxn ang="0">
-                <a:pos x="connsiteX0" y="connsiteY0"/>
-              </a:cxn>
-              <a:cxn ang="0">
-                <a:pos x="connsiteX1" y="connsiteY1"/>
-              </a:cxn>
-              <a:cxn ang="0">
-                <a:pos x="connsiteX2" y="connsiteY2"/>
-              </a:cxn>
-              <a:cxn ang="0">
-                <a:pos x="connsiteX3" y="connsiteY3"/>
-              </a:cxn>
-              <a:cxn ang="0">
-                <a:pos x="connsiteX4" y="connsiteY4"/>
-              </a:cxn>
-              <a:cxn ang="0">
-                <a:pos x="connsiteX5" y="connsiteY5"/>
-              </a:cxn>
-              <a:cxn ang="0">
-                <a:pos x="connsiteX6" y="connsiteY6"/>
-              </a:cxn>
-              <a:cxn ang="0">
-                <a:pos x="connsiteX7" y="connsiteY7"/>
-              </a:cxn>
-              <a:cxn ang="0">
-                <a:pos x="connsiteX8" y="connsiteY8"/>
-              </a:cxn>
-              <a:cxn ang="0">
-                <a:pos x="connsiteX9" y="connsiteY9"/>
-              </a:cxn>
-            </a:cxnLst>
-            <a:rect l="l" t="t" r="r" b="b"/>
-            <a:pathLst>
-              <a:path w="2376435" h="6858000">
-                <a:moveTo>
-                  <a:pt x="0" y="0"/>
-                </a:moveTo>
-                <a:lnTo>
-                  <a:pt x="2376435" y="0"/>
-                </a:lnTo>
-                <a:lnTo>
-                  <a:pt x="2376435" y="584200"/>
-                </a:lnTo>
-                <a:lnTo>
-                  <a:pt x="2376435" y="1244600"/>
-                </a:lnTo>
-                <a:lnTo>
-                  <a:pt x="2376435" y="1650138"/>
-                </a:lnTo>
-                <a:lnTo>
-                  <a:pt x="2376435" y="2310538"/>
-                </a:lnTo>
-                <a:lnTo>
-                  <a:pt x="2376435" y="2603145"/>
-                </a:lnTo>
-                <a:lnTo>
-                  <a:pt x="2376435" y="3263545"/>
-                </a:lnTo>
-                <a:lnTo>
-                  <a:pt x="2376435" y="6858000"/>
-                </a:lnTo>
-                <a:lnTo>
-                  <a:pt x="0" y="6858000"/>
-                </a:lnTo>
-                <a:close/>
-              </a:path>
-            </a:pathLst>
-          </a:custGeom>
-        </p:spPr>
-        <p:style>
-          <a:lnRef idx="1">
-            <a:schemeClr val="dk1"/>
-          </a:lnRef>
-          <a:fillRef idx="3">
-            <a:schemeClr val="dk1"/>
-          </a:fillRef>
-          <a:effectRef idx="2">
-            <a:schemeClr val="dk1"/>
-          </a:effectRef>
-          <a:fontRef idx="minor">
-            <a:schemeClr val="lt1"/>
-          </a:fontRef>
-        </p:style>
-        <p:txBody>
-          <a:bodyPr wrap="square" rtlCol="0" anchor="ctr">
-            <a:noAutofit/>
-          </a:bodyPr>
-          <a:lstStyle/>
-          <a:p>
-            <a:pPr algn="ctr"/>
-            <a:endParaRPr lang="fr-FR"/>
-          </a:p>
-        </p:txBody>
-      </p:sp>
-      <p:sp>
-        <p:nvSpPr>
-          <p:cNvPr id="48" name="Forme libre 47">
-            <a:extLst>
-              <a:ext uri="{FF2B5EF4-FFF2-40B4-BE49-F238E27FC236}">
-                <a16:creationId xmlns:a16="http://schemas.microsoft.com/office/drawing/2014/main" id="{DC3E17ED-F21D-98DD-1DF0-B6A55936550D}"/>
-              </a:ext>
-            </a:extLst>
-          </p:cNvPr>
-          <p:cNvSpPr/>
-          <p:nvPr/>
-        </p:nvSpPr>
-        <p:spPr>
-          <a:xfrm>
-            <a:off x="0" y="1357569"/>
-            <a:ext cx="330200" cy="660400"/>
-          </a:xfrm>
-          <a:custGeom>
-            <a:avLst/>
-            <a:gdLst>
-              <a:gd name="connsiteX0" fmla="*/ 0 w 330200"/>
-              <a:gd name="connsiteY0" fmla="*/ 0 h 660400"/>
-              <a:gd name="connsiteX1" fmla="*/ 330200 w 330200"/>
-              <a:gd name="connsiteY1" fmla="*/ 330200 h 660400"/>
-              <a:gd name="connsiteX2" fmla="*/ 0 w 330200"/>
-              <a:gd name="connsiteY2" fmla="*/ 660400 h 660400"/>
-              <a:gd name="connsiteX3" fmla="*/ 0 w 330200"/>
-              <a:gd name="connsiteY3" fmla="*/ 0 h 660400"/>
-            </a:gdLst>
-            <a:ahLst/>
-            <a:cxnLst>
-              <a:cxn ang="0">
-                <a:pos x="connsiteX0" y="connsiteY0"/>
-              </a:cxn>
-              <a:cxn ang="0">
-                <a:pos x="connsiteX1" y="connsiteY1"/>
-              </a:cxn>
-              <a:cxn ang="0">
-                <a:pos x="connsiteX2" y="connsiteY2"/>
-              </a:cxn>
-              <a:cxn ang="0">
-                <a:pos x="connsiteX3" y="connsiteY3"/>
-              </a:cxn>
-            </a:cxnLst>
-            <a:rect l="l" t="t" r="r" b="b"/>
-            <a:pathLst>
-              <a:path w="330200" h="660400">
-                <a:moveTo>
-                  <a:pt x="0" y="0"/>
-                </a:moveTo>
-                <a:cubicBezTo>
-                  <a:pt x="182364" y="0"/>
-                  <a:pt x="330200" y="147836"/>
-                  <a:pt x="330200" y="330200"/>
-                </a:cubicBezTo>
-                <a:cubicBezTo>
-                  <a:pt x="330200" y="512564"/>
-                  <a:pt x="182364" y="660400"/>
-                  <a:pt x="0" y="660400"/>
-                </a:cubicBezTo>
-                <a:lnTo>
-                  <a:pt x="0" y="0"/>
-                </a:lnTo>
-                <a:close/>
-              </a:path>
-            </a:pathLst>
-          </a:custGeom>
-          <a:solidFill>
-            <a:srgbClr val="F3103A"/>
-          </a:solidFill>
-          <a:ln>
-            <a:noFill/>
-          </a:ln>
-        </p:spPr>
-        <p:style>
-          <a:lnRef idx="0">
-            <a:scrgbClr r="0" g="0" b="0"/>
-          </a:lnRef>
-          <a:fillRef idx="0">
-            <a:scrgbClr r="0" g="0" b="0"/>
-          </a:fillRef>
-          <a:effectRef idx="0">
-            <a:scrgbClr r="0" g="0" b="0"/>
-          </a:effectRef>
-          <a:fontRef idx="minor">
-            <a:schemeClr val="lt1"/>
-          </a:fontRef>
-        </p:style>
-        <p:txBody>
-          <a:bodyPr wrap="square" rtlCol="0" anchor="ctr">
-            <a:noAutofit/>
-          </a:bodyPr>
-          <a:lstStyle/>
-          <a:p>
-            <a:pPr algn="ctr"/>
-            <a:endParaRPr lang="fr-FR"/>
-          </a:p>
-        </p:txBody>
-      </p:sp>
-      <p:pic>
-        <p:nvPicPr>
-          <p:cNvPr id="16" name="Image 15">
-            <a:extLst>
-              <a:ext uri="{FF2B5EF4-FFF2-40B4-BE49-F238E27FC236}">
-                <a16:creationId xmlns:a16="http://schemas.microsoft.com/office/drawing/2014/main" id="{073F310E-848B-1726-E797-DC5113CEA523}"/>
-              </a:ext>
-            </a:extLst>
-          </p:cNvPr>
-          <p:cNvPicPr>
-            <a:picLocks noChangeAspect="1"/>
-          </p:cNvPicPr>
-          <p:nvPr/>
-        </p:nvPicPr>
-        <p:blipFill rotWithShape="1">
-          <a:blip r:embed="rId3"/>
-          <a:srcRect r="72930"/>
-          <a:stretch/>
-        </p:blipFill>
-        <p:spPr>
-          <a:xfrm>
-            <a:off x="637278" y="130629"/>
-            <a:ext cx="1101877" cy="1272695"/>
-          </a:xfrm>
-          <a:prstGeom prst="rect">
-            <a:avLst/>
-          </a:prstGeom>
-        </p:spPr>
-      </p:pic>
-      <p:sp>
-        <p:nvSpPr>
-          <p:cNvPr id="6" name="ZoneTexte 5">
-            <a:extLst>
-              <a:ext uri="{FF2B5EF4-FFF2-40B4-BE49-F238E27FC236}">
-                <a16:creationId xmlns:a16="http://schemas.microsoft.com/office/drawing/2014/main" id="{EFAB062C-6780-9748-49BE-3B224AB8F621}"/>
-              </a:ext>
-            </a:extLst>
-          </p:cNvPr>
-          <p:cNvSpPr txBox="1"/>
-          <p:nvPr/>
-        </p:nvSpPr>
-        <p:spPr>
-          <a:xfrm>
-            <a:off x="329800" y="1333826"/>
-            <a:ext cx="1716832" cy="707886"/>
-          </a:xfrm>
-          <a:prstGeom prst="rect">
-            <a:avLst/>
-          </a:prstGeom>
-          <a:noFill/>
-        </p:spPr>
-        <p:txBody>
-          <a:bodyPr wrap="square" rtlCol="0">
-            <a:spAutoFit/>
-          </a:bodyPr>
-          <a:lstStyle/>
-          <a:p>
-            <a:r>
-              <a:rPr lang="fr-FR" sz="2000" dirty="0">
-                <a:solidFill>
-                  <a:schemeClr val="bg1"/>
-                </a:solidFill>
-              </a:rPr>
-              <a:t>Formulaires Typés</a:t>
-            </a:r>
-          </a:p>
-        </p:txBody>
-      </p:sp>
-      <p:sp>
-        <p:nvSpPr>
-          <p:cNvPr id="8" name="ZoneTexte 7">
-            <a:extLst>
-              <a:ext uri="{FF2B5EF4-FFF2-40B4-BE49-F238E27FC236}">
-                <a16:creationId xmlns:a16="http://schemas.microsoft.com/office/drawing/2014/main" id="{780274AB-95AA-36AA-5B11-29890641E2AD}"/>
-              </a:ext>
-            </a:extLst>
-          </p:cNvPr>
-          <p:cNvSpPr txBox="1"/>
-          <p:nvPr/>
-        </p:nvSpPr>
-        <p:spPr>
-          <a:xfrm>
-            <a:off x="2470775" y="34803"/>
-            <a:ext cx="3711540" cy="646331"/>
-          </a:xfrm>
-          <a:prstGeom prst="rect">
-            <a:avLst/>
-          </a:prstGeom>
-          <a:noFill/>
-        </p:spPr>
-        <p:txBody>
-          <a:bodyPr wrap="square" rtlCol="0">
-            <a:spAutoFit/>
-          </a:bodyPr>
-          <a:lstStyle/>
-          <a:p>
-            <a:r>
-              <a:rPr lang="fr-FR" sz="3600" dirty="0"/>
-              <a:t>Formulaires typés</a:t>
-            </a:r>
-          </a:p>
-        </p:txBody>
-      </p:sp>
-    </p:spTree>
-    <p:extLst>
-      <p:ext uri="{BB962C8B-B14F-4D97-AF65-F5344CB8AC3E}">
-        <p14:creationId xmlns:p14="http://schemas.microsoft.com/office/powerpoint/2010/main" val="2196303666"/>
-      </p:ext>
-    </p:extLst>
-  </p:cSld>
-  <p:clrMapOvr>
-    <a:masterClrMapping/>
-  </p:clrMapOvr>
-  <mc:AlternateContent xmlns:mc="http://schemas.openxmlformats.org/markup-compatibility/2006" xmlns:p159="http://schemas.microsoft.com/office/powerpoint/2015/09/main">
-    <mc:Choice Requires="p159">
-      <p:transition spd="slow">
-        <p159:morph option="byObject"/>
-      </p:transition>
-    </mc:Choice>
-    <mc:Fallback xmlns="">
-      <p:transition spd="slow">
-        <p:fade/>
-      </p:transition>
-    </mc:Fallback>
-  </mc:AlternateContent>
-</p:sld>
-</file>
-
-<file path=ppt/slides/slide21.xml><?xml version="1.0" encoding="utf-8"?>
-<p:sld xmlns:a="http://schemas.openxmlformats.org/drawingml/2006/main" xmlns:r="http://schemas.openxmlformats.org/officeDocument/2006/relationships" xmlns:p="http://schemas.openxmlformats.org/presentationml/2006/main">
-  <p:cSld>
-    <p:spTree>
-      <p:nvGrpSpPr>
-        <p:cNvPr id="1" name="">
-          <a:extLst>
-            <a:ext uri="{FF2B5EF4-FFF2-40B4-BE49-F238E27FC236}">
-              <a16:creationId xmlns:a16="http://schemas.microsoft.com/office/drawing/2014/main" id="{21CFFE71-9B98-9B1F-4B52-78C62C0453F2}"/>
-            </a:ext>
-          </a:extLst>
-        </p:cNvPr>
-        <p:cNvGrpSpPr/>
-        <p:nvPr/>
-      </p:nvGrpSpPr>
-      <p:grpSpPr>
-        <a:xfrm>
-          <a:off x="0" y="0"/>
-          <a:ext cx="0" cy="0"/>
-          <a:chOff x="0" y="0"/>
-          <a:chExt cx="0" cy="0"/>
-        </a:xfrm>
-      </p:grpSpPr>
-      <p:sp>
-        <p:nvSpPr>
-          <p:cNvPr id="53" name="Forme libre 52">
-            <a:extLst>
-              <a:ext uri="{FF2B5EF4-FFF2-40B4-BE49-F238E27FC236}">
-                <a16:creationId xmlns:a16="http://schemas.microsoft.com/office/drawing/2014/main" id="{9F1E427B-0882-9B77-624C-BE9021BFE934}"/>
-              </a:ext>
-            </a:extLst>
-          </p:cNvPr>
-          <p:cNvSpPr/>
-          <p:nvPr/>
-        </p:nvSpPr>
-        <p:spPr>
-          <a:xfrm>
-            <a:off x="0" y="0"/>
-            <a:ext cx="12192000" cy="6858000"/>
-          </a:xfrm>
-          <a:custGeom>
-            <a:avLst/>
-            <a:gdLst>
-              <a:gd name="connsiteX0" fmla="*/ 0 w 2376435"/>
-              <a:gd name="connsiteY0" fmla="*/ 0 h 6858000"/>
-              <a:gd name="connsiteX1" fmla="*/ 2376435 w 2376435"/>
-              <a:gd name="connsiteY1" fmla="*/ 0 h 6858000"/>
-              <a:gd name="connsiteX2" fmla="*/ 2376435 w 2376435"/>
-              <a:gd name="connsiteY2" fmla="*/ 584200 h 6858000"/>
-              <a:gd name="connsiteX3" fmla="*/ 2376435 w 2376435"/>
-              <a:gd name="connsiteY3" fmla="*/ 1244600 h 6858000"/>
-              <a:gd name="connsiteX4" fmla="*/ 2376435 w 2376435"/>
-              <a:gd name="connsiteY4" fmla="*/ 1650138 h 6858000"/>
-              <a:gd name="connsiteX5" fmla="*/ 2376435 w 2376435"/>
-              <a:gd name="connsiteY5" fmla="*/ 2310538 h 6858000"/>
-              <a:gd name="connsiteX6" fmla="*/ 2376435 w 2376435"/>
-              <a:gd name="connsiteY6" fmla="*/ 2603145 h 6858000"/>
-              <a:gd name="connsiteX7" fmla="*/ 2376435 w 2376435"/>
-              <a:gd name="connsiteY7" fmla="*/ 3263545 h 6858000"/>
-              <a:gd name="connsiteX8" fmla="*/ 2376435 w 2376435"/>
-              <a:gd name="connsiteY8" fmla="*/ 6858000 h 6858000"/>
-              <a:gd name="connsiteX9" fmla="*/ 0 w 2376435"/>
-              <a:gd name="connsiteY9" fmla="*/ 6858000 h 6858000"/>
-            </a:gdLst>
-            <a:ahLst/>
-            <a:cxnLst>
-              <a:cxn ang="0">
-                <a:pos x="connsiteX0" y="connsiteY0"/>
-              </a:cxn>
-              <a:cxn ang="0">
-                <a:pos x="connsiteX1" y="connsiteY1"/>
-              </a:cxn>
-              <a:cxn ang="0">
-                <a:pos x="connsiteX2" y="connsiteY2"/>
-              </a:cxn>
-              <a:cxn ang="0">
-                <a:pos x="connsiteX3" y="connsiteY3"/>
-              </a:cxn>
-              <a:cxn ang="0">
-                <a:pos x="connsiteX4" y="connsiteY4"/>
-              </a:cxn>
-              <a:cxn ang="0">
-                <a:pos x="connsiteX5" y="connsiteY5"/>
-              </a:cxn>
-              <a:cxn ang="0">
-                <a:pos x="connsiteX6" y="connsiteY6"/>
-              </a:cxn>
-              <a:cxn ang="0">
-                <a:pos x="connsiteX7" y="connsiteY7"/>
-              </a:cxn>
-              <a:cxn ang="0">
-                <a:pos x="connsiteX8" y="connsiteY8"/>
-              </a:cxn>
-              <a:cxn ang="0">
-                <a:pos x="connsiteX9" y="connsiteY9"/>
-              </a:cxn>
-            </a:cxnLst>
-            <a:rect l="l" t="t" r="r" b="b"/>
-            <a:pathLst>
-              <a:path w="2376435" h="6858000">
-                <a:moveTo>
-                  <a:pt x="0" y="0"/>
-                </a:moveTo>
-                <a:lnTo>
-                  <a:pt x="2376435" y="0"/>
-                </a:lnTo>
-                <a:lnTo>
-                  <a:pt x="2376435" y="584200"/>
-                </a:lnTo>
-                <a:lnTo>
-                  <a:pt x="2376435" y="1244600"/>
-                </a:lnTo>
-                <a:lnTo>
-                  <a:pt x="2376435" y="1650138"/>
-                </a:lnTo>
-                <a:lnTo>
-                  <a:pt x="2376435" y="2310538"/>
-                </a:lnTo>
-                <a:lnTo>
-                  <a:pt x="2376435" y="2603145"/>
-                </a:lnTo>
-                <a:lnTo>
-                  <a:pt x="2376435" y="3263545"/>
-                </a:lnTo>
-                <a:lnTo>
-                  <a:pt x="2376435" y="6858000"/>
-                </a:lnTo>
-                <a:lnTo>
-                  <a:pt x="0" y="6858000"/>
-                </a:lnTo>
-                <a:close/>
-              </a:path>
-            </a:pathLst>
-          </a:custGeom>
-        </p:spPr>
-        <p:style>
-          <a:lnRef idx="1">
-            <a:schemeClr val="dk1"/>
-          </a:lnRef>
-          <a:fillRef idx="3">
-            <a:schemeClr val="dk1"/>
-          </a:fillRef>
-          <a:effectRef idx="2">
-            <a:schemeClr val="dk1"/>
-          </a:effectRef>
-          <a:fontRef idx="minor">
-            <a:schemeClr val="lt1"/>
-          </a:fontRef>
-        </p:style>
-        <p:txBody>
-          <a:bodyPr wrap="square" rtlCol="0" anchor="ctr">
-            <a:noAutofit/>
-          </a:bodyPr>
-          <a:lstStyle/>
-          <a:p>
-            <a:pPr algn="ctr"/>
-            <a:endParaRPr lang="fr-FR"/>
-          </a:p>
-        </p:txBody>
-      </p:sp>
-      <p:sp>
-        <p:nvSpPr>
-          <p:cNvPr id="37" name="ZoneTexte 36">
-            <a:extLst>
-              <a:ext uri="{FF2B5EF4-FFF2-40B4-BE49-F238E27FC236}">
-                <a16:creationId xmlns:a16="http://schemas.microsoft.com/office/drawing/2014/main" id="{1A940947-5AD3-B5FF-4609-0AACFBF39AEE}"/>
-              </a:ext>
-            </a:extLst>
-          </p:cNvPr>
-          <p:cNvSpPr txBox="1"/>
-          <p:nvPr/>
-        </p:nvSpPr>
-        <p:spPr>
-          <a:xfrm>
-            <a:off x="2629367" y="4130767"/>
-            <a:ext cx="6933267" cy="769441"/>
-          </a:xfrm>
-          <a:prstGeom prst="rect">
-            <a:avLst/>
-          </a:prstGeom>
-          <a:noFill/>
-        </p:spPr>
-        <p:txBody>
-          <a:bodyPr wrap="square" rtlCol="0">
-            <a:spAutoFit/>
-          </a:bodyPr>
-          <a:lstStyle/>
-          <a:p>
-            <a:pPr algn="ctr"/>
-            <a:r>
-              <a:rPr lang="fr-FR" sz="4400" dirty="0">
-                <a:solidFill>
-                  <a:schemeClr val="bg1"/>
-                </a:solidFill>
-              </a:rPr>
-              <a:t>Conclusion</a:t>
-            </a:r>
-          </a:p>
-        </p:txBody>
-      </p:sp>
-      <p:pic>
-        <p:nvPicPr>
-          <p:cNvPr id="6" name="Image 5">
-            <a:extLst>
-              <a:ext uri="{FF2B5EF4-FFF2-40B4-BE49-F238E27FC236}">
-                <a16:creationId xmlns:a16="http://schemas.microsoft.com/office/drawing/2014/main" id="{7BA6CB53-9ECB-C913-117C-7B7301939BF7}"/>
-              </a:ext>
-            </a:extLst>
-          </p:cNvPr>
-          <p:cNvPicPr>
-            <a:picLocks noChangeAspect="1"/>
-          </p:cNvPicPr>
-          <p:nvPr/>
-        </p:nvPicPr>
-        <p:blipFill>
-          <a:blip r:embed="rId3"/>
-          <a:stretch>
-            <a:fillRect/>
-          </a:stretch>
-        </p:blipFill>
-        <p:spPr>
-          <a:xfrm>
-            <a:off x="2209800" y="489098"/>
-            <a:ext cx="7772400" cy="2430195"/>
-          </a:xfrm>
-          <a:prstGeom prst="rect">
-            <a:avLst/>
-          </a:prstGeom>
-        </p:spPr>
-      </p:pic>
-    </p:spTree>
-    <p:extLst>
-      <p:ext uri="{BB962C8B-B14F-4D97-AF65-F5344CB8AC3E}">
-        <p14:creationId xmlns:p14="http://schemas.microsoft.com/office/powerpoint/2010/main" val="3253818937"/>
-      </p:ext>
-    </p:extLst>
-  </p:cSld>
-  <p:clrMapOvr>
-    <a:masterClrMapping/>
-  </p:clrMapOvr>
-  <mc:AlternateContent xmlns:mc="http://schemas.openxmlformats.org/markup-compatibility/2006" xmlns:p159="http://schemas.microsoft.com/office/powerpoint/2015/09/main">
-    <mc:Choice Requires="p159">
-      <p:transition spd="slow">
-        <p159:morph option="byObject"/>
-      </p:transition>
-    </mc:Choice>
-    <mc:Fallback xmlns="">
-      <p:transition spd="slow">
-        <p:fade/>
-      </p:transition>
-    </mc:Fallback>
-  </mc:AlternateContent>
-</p:sld>
-</file>
-
-<file path=ppt/slides/slide22.xml><?xml version="1.0" encoding="utf-8"?>
-<p:sld xmlns:a="http://schemas.openxmlformats.org/drawingml/2006/main" xmlns:r="http://schemas.openxmlformats.org/officeDocument/2006/relationships" xmlns:p="http://schemas.openxmlformats.org/presentationml/2006/main">
-  <p:cSld>
-    <p:spTree>
-      <p:nvGrpSpPr>
-        <p:cNvPr id="1" name="">
-          <a:extLst>
-            <a:ext uri="{FF2B5EF4-FFF2-40B4-BE49-F238E27FC236}">
-              <a16:creationId xmlns:a16="http://schemas.microsoft.com/office/drawing/2014/main" id="{C71D6E6C-E82E-5903-5BFA-47B455C7DCA3}"/>
-            </a:ext>
-          </a:extLst>
-        </p:cNvPr>
-        <p:cNvGrpSpPr/>
-        <p:nvPr/>
-      </p:nvGrpSpPr>
-      <p:grpSpPr>
-        <a:xfrm>
-          <a:off x="0" y="0"/>
-          <a:ext cx="0" cy="0"/>
-          <a:chOff x="0" y="0"/>
-          <a:chExt cx="0" cy="0"/>
-        </a:xfrm>
-      </p:grpSpPr>
-      <p:sp>
-        <p:nvSpPr>
-          <p:cNvPr id="53" name="Forme libre 52">
-            <a:extLst>
-              <a:ext uri="{FF2B5EF4-FFF2-40B4-BE49-F238E27FC236}">
-                <a16:creationId xmlns:a16="http://schemas.microsoft.com/office/drawing/2014/main" id="{D8B2147D-1787-A166-FC41-CBB71DFBC6DA}"/>
-              </a:ext>
-            </a:extLst>
-          </p:cNvPr>
-          <p:cNvSpPr/>
-          <p:nvPr/>
-        </p:nvSpPr>
-        <p:spPr>
-          <a:xfrm>
-            <a:off x="0" y="0"/>
-            <a:ext cx="12192000" cy="6858000"/>
-          </a:xfrm>
-          <a:custGeom>
-            <a:avLst/>
-            <a:gdLst>
-              <a:gd name="connsiteX0" fmla="*/ 0 w 2376435"/>
-              <a:gd name="connsiteY0" fmla="*/ 0 h 6858000"/>
-              <a:gd name="connsiteX1" fmla="*/ 2376435 w 2376435"/>
-              <a:gd name="connsiteY1" fmla="*/ 0 h 6858000"/>
-              <a:gd name="connsiteX2" fmla="*/ 2376435 w 2376435"/>
-              <a:gd name="connsiteY2" fmla="*/ 584200 h 6858000"/>
-              <a:gd name="connsiteX3" fmla="*/ 2376435 w 2376435"/>
-              <a:gd name="connsiteY3" fmla="*/ 1244600 h 6858000"/>
-              <a:gd name="connsiteX4" fmla="*/ 2376435 w 2376435"/>
-              <a:gd name="connsiteY4" fmla="*/ 1650138 h 6858000"/>
-              <a:gd name="connsiteX5" fmla="*/ 2376435 w 2376435"/>
-              <a:gd name="connsiteY5" fmla="*/ 2310538 h 6858000"/>
-              <a:gd name="connsiteX6" fmla="*/ 2376435 w 2376435"/>
-              <a:gd name="connsiteY6" fmla="*/ 2603145 h 6858000"/>
-              <a:gd name="connsiteX7" fmla="*/ 2376435 w 2376435"/>
-              <a:gd name="connsiteY7" fmla="*/ 3263545 h 6858000"/>
-              <a:gd name="connsiteX8" fmla="*/ 2376435 w 2376435"/>
-              <a:gd name="connsiteY8" fmla="*/ 6858000 h 6858000"/>
-              <a:gd name="connsiteX9" fmla="*/ 0 w 2376435"/>
-              <a:gd name="connsiteY9" fmla="*/ 6858000 h 6858000"/>
-            </a:gdLst>
-            <a:ahLst/>
-            <a:cxnLst>
-              <a:cxn ang="0">
-                <a:pos x="connsiteX0" y="connsiteY0"/>
-              </a:cxn>
-              <a:cxn ang="0">
-                <a:pos x="connsiteX1" y="connsiteY1"/>
-              </a:cxn>
-              <a:cxn ang="0">
-                <a:pos x="connsiteX2" y="connsiteY2"/>
-              </a:cxn>
-              <a:cxn ang="0">
-                <a:pos x="connsiteX3" y="connsiteY3"/>
-              </a:cxn>
-              <a:cxn ang="0">
-                <a:pos x="connsiteX4" y="connsiteY4"/>
-              </a:cxn>
-              <a:cxn ang="0">
-                <a:pos x="connsiteX5" y="connsiteY5"/>
-              </a:cxn>
-              <a:cxn ang="0">
-                <a:pos x="connsiteX6" y="connsiteY6"/>
-              </a:cxn>
-              <a:cxn ang="0">
-                <a:pos x="connsiteX7" y="connsiteY7"/>
-              </a:cxn>
-              <a:cxn ang="0">
-                <a:pos x="connsiteX8" y="connsiteY8"/>
-              </a:cxn>
-              <a:cxn ang="0">
-                <a:pos x="connsiteX9" y="connsiteY9"/>
-              </a:cxn>
-            </a:cxnLst>
-            <a:rect l="l" t="t" r="r" b="b"/>
-            <a:pathLst>
-              <a:path w="2376435" h="6858000">
-                <a:moveTo>
-                  <a:pt x="0" y="0"/>
-                </a:moveTo>
-                <a:lnTo>
-                  <a:pt x="2376435" y="0"/>
-                </a:lnTo>
-                <a:lnTo>
-                  <a:pt x="2376435" y="584200"/>
-                </a:lnTo>
-                <a:lnTo>
-                  <a:pt x="2376435" y="1244600"/>
-                </a:lnTo>
-                <a:lnTo>
-                  <a:pt x="2376435" y="1650138"/>
-                </a:lnTo>
-                <a:lnTo>
-                  <a:pt x="2376435" y="2310538"/>
-                </a:lnTo>
-                <a:lnTo>
-                  <a:pt x="2376435" y="2603145"/>
-                </a:lnTo>
-                <a:lnTo>
-                  <a:pt x="2376435" y="3263545"/>
-                </a:lnTo>
-                <a:lnTo>
-                  <a:pt x="2376435" y="6858000"/>
-                </a:lnTo>
-                <a:lnTo>
-                  <a:pt x="0" y="6858000"/>
-                </a:lnTo>
-                <a:close/>
-              </a:path>
-            </a:pathLst>
-          </a:custGeom>
-        </p:spPr>
-        <p:style>
-          <a:lnRef idx="1">
-            <a:schemeClr val="dk1"/>
-          </a:lnRef>
-          <a:fillRef idx="3">
-            <a:schemeClr val="dk1"/>
-          </a:fillRef>
-          <a:effectRef idx="2">
-            <a:schemeClr val="dk1"/>
-          </a:effectRef>
-          <a:fontRef idx="minor">
-            <a:schemeClr val="lt1"/>
-          </a:fontRef>
-        </p:style>
-        <p:txBody>
-          <a:bodyPr wrap="square" rtlCol="0" anchor="ctr">
-            <a:noAutofit/>
-          </a:bodyPr>
-          <a:lstStyle/>
-          <a:p>
-            <a:pPr algn="ctr"/>
-            <a:endParaRPr lang="fr-FR"/>
-          </a:p>
-        </p:txBody>
-      </p:sp>
-      <p:sp>
-        <p:nvSpPr>
-          <p:cNvPr id="37" name="ZoneTexte 36">
-            <a:extLst>
-              <a:ext uri="{FF2B5EF4-FFF2-40B4-BE49-F238E27FC236}">
-                <a16:creationId xmlns:a16="http://schemas.microsoft.com/office/drawing/2014/main" id="{724392C2-A484-587A-8ABC-2345136F15D6}"/>
-              </a:ext>
-            </a:extLst>
-          </p:cNvPr>
-          <p:cNvSpPr txBox="1"/>
-          <p:nvPr/>
-        </p:nvSpPr>
-        <p:spPr>
-          <a:xfrm>
-            <a:off x="2629367" y="4130767"/>
-            <a:ext cx="6933267" cy="769441"/>
-          </a:xfrm>
-          <a:prstGeom prst="rect">
-            <a:avLst/>
-          </a:prstGeom>
-          <a:noFill/>
-        </p:spPr>
-        <p:txBody>
-          <a:bodyPr wrap="square" rtlCol="0">
-            <a:spAutoFit/>
-          </a:bodyPr>
-          <a:lstStyle/>
-          <a:p>
-            <a:pPr algn="ctr"/>
-            <a:r>
-              <a:rPr lang="fr-FR" sz="4400" dirty="0">
-                <a:solidFill>
-                  <a:schemeClr val="bg1"/>
-                </a:solidFill>
-              </a:rPr>
-              <a:t>Merci !</a:t>
-            </a:r>
-          </a:p>
-        </p:txBody>
-      </p:sp>
-      <p:pic>
-        <p:nvPicPr>
-          <p:cNvPr id="6" name="Image 5">
-            <a:extLst>
-              <a:ext uri="{FF2B5EF4-FFF2-40B4-BE49-F238E27FC236}">
-                <a16:creationId xmlns:a16="http://schemas.microsoft.com/office/drawing/2014/main" id="{01ECC903-B862-A4B2-F8A4-5D8FC7605713}"/>
-              </a:ext>
-            </a:extLst>
-          </p:cNvPr>
-          <p:cNvPicPr>
-            <a:picLocks noChangeAspect="1"/>
-          </p:cNvPicPr>
-          <p:nvPr/>
-        </p:nvPicPr>
-        <p:blipFill>
-          <a:blip r:embed="rId3"/>
-          <a:stretch>
-            <a:fillRect/>
-          </a:stretch>
-        </p:blipFill>
-        <p:spPr>
-          <a:xfrm>
-            <a:off x="2209800" y="489098"/>
-            <a:ext cx="7772400" cy="2430195"/>
-          </a:xfrm>
-          <a:prstGeom prst="rect">
-            <a:avLst/>
-          </a:prstGeom>
-        </p:spPr>
-      </p:pic>
-    </p:spTree>
-    <p:extLst>
-      <p:ext uri="{BB962C8B-B14F-4D97-AF65-F5344CB8AC3E}">
-        <p14:creationId xmlns:p14="http://schemas.microsoft.com/office/powerpoint/2010/main" val="1437912832"/>
       </p:ext>
     </p:extLst>
   </p:cSld>
@@ -17267,105 +13656,6 @@
           </a:p>
         </p:txBody>
       </p:sp>
-      <p:sp>
-        <p:nvSpPr>
-          <p:cNvPr id="48" name="Forme libre 47">
-            <a:extLst>
-              <a:ext uri="{FF2B5EF4-FFF2-40B4-BE49-F238E27FC236}">
-                <a16:creationId xmlns:a16="http://schemas.microsoft.com/office/drawing/2014/main" id="{AC72E03C-7884-50E1-8DF9-6AA67714D92B}"/>
-              </a:ext>
-            </a:extLst>
-          </p:cNvPr>
-          <p:cNvSpPr/>
-          <p:nvPr/>
-        </p:nvSpPr>
-        <p:spPr>
-          <a:xfrm>
-            <a:off x="0" y="6346586"/>
-            <a:ext cx="330200" cy="660400"/>
-          </a:xfrm>
-          <a:custGeom>
-            <a:avLst/>
-            <a:gdLst>
-              <a:gd name="connsiteX0" fmla="*/ 0 w 330200"/>
-              <a:gd name="connsiteY0" fmla="*/ 0 h 660400"/>
-              <a:gd name="connsiteX1" fmla="*/ 330200 w 330200"/>
-              <a:gd name="connsiteY1" fmla="*/ 330200 h 660400"/>
-              <a:gd name="connsiteX2" fmla="*/ 0 w 330200"/>
-              <a:gd name="connsiteY2" fmla="*/ 660400 h 660400"/>
-              <a:gd name="connsiteX3" fmla="*/ 0 w 330200"/>
-              <a:gd name="connsiteY3" fmla="*/ 0 h 660400"/>
-            </a:gdLst>
-            <a:ahLst/>
-            <a:cxnLst>
-              <a:cxn ang="0">
-                <a:pos x="connsiteX0" y="connsiteY0"/>
-              </a:cxn>
-              <a:cxn ang="0">
-                <a:pos x="connsiteX1" y="connsiteY1"/>
-              </a:cxn>
-              <a:cxn ang="0">
-                <a:pos x="connsiteX2" y="connsiteY2"/>
-              </a:cxn>
-              <a:cxn ang="0">
-                <a:pos x="connsiteX3" y="connsiteY3"/>
-              </a:cxn>
-            </a:cxnLst>
-            <a:rect l="l" t="t" r="r" b="b"/>
-            <a:pathLst>
-              <a:path w="330200" h="660400">
-                <a:moveTo>
-                  <a:pt x="0" y="0"/>
-                </a:moveTo>
-                <a:cubicBezTo>
-                  <a:pt x="182364" y="0"/>
-                  <a:pt x="330200" y="147836"/>
-                  <a:pt x="330200" y="330200"/>
-                </a:cubicBezTo>
-                <a:cubicBezTo>
-                  <a:pt x="330200" y="512564"/>
-                  <a:pt x="182364" y="660400"/>
-                  <a:pt x="0" y="660400"/>
-                </a:cubicBezTo>
-                <a:lnTo>
-                  <a:pt x="0" y="0"/>
-                </a:lnTo>
-                <a:close/>
-              </a:path>
-            </a:pathLst>
-          </a:custGeom>
-          <a:solidFill>
-            <a:srgbClr val="F3103A"/>
-          </a:solidFill>
-          <a:ln>
-            <a:noFill/>
-          </a:ln>
-        </p:spPr>
-        <p:style>
-          <a:lnRef idx="0">
-            <a:scrgbClr r="0" g="0" b="0"/>
-          </a:lnRef>
-          <a:fillRef idx="0">
-            <a:scrgbClr r="0" g="0" b="0"/>
-          </a:fillRef>
-          <a:effectRef idx="0">
-            <a:scrgbClr r="0" g="0" b="0"/>
-          </a:effectRef>
-          <a:fontRef idx="minor">
-            <a:schemeClr val="lt1"/>
-          </a:fontRef>
-        </p:style>
-        <p:txBody>
-          <a:bodyPr wrap="square" rtlCol="0" anchor="ctr">
-            <a:noAutofit/>
-          </a:bodyPr>
-          <a:lstStyle/>
-          <a:p>
-            <a:pPr algn="ctr"/>
-            <a:endParaRPr lang="fr-FR"/>
-          </a:p>
-        </p:txBody>
-      </p:sp>
       <p:pic>
         <p:nvPicPr>
           <p:cNvPr id="16" name="Image 15">
@@ -18322,105 +14612,6 @@
           </a:p>
         </p:txBody>
       </p:sp>
-      <p:sp>
-        <p:nvSpPr>
-          <p:cNvPr id="48" name="Forme libre 47">
-            <a:extLst>
-              <a:ext uri="{FF2B5EF4-FFF2-40B4-BE49-F238E27FC236}">
-                <a16:creationId xmlns:a16="http://schemas.microsoft.com/office/drawing/2014/main" id="{D39438DD-CE29-BB3A-170E-D35119BB24DF}"/>
-              </a:ext>
-            </a:extLst>
-          </p:cNvPr>
-          <p:cNvSpPr/>
-          <p:nvPr/>
-        </p:nvSpPr>
-        <p:spPr>
-          <a:xfrm>
-            <a:off x="0" y="6346586"/>
-            <a:ext cx="330200" cy="660400"/>
-          </a:xfrm>
-          <a:custGeom>
-            <a:avLst/>
-            <a:gdLst>
-              <a:gd name="connsiteX0" fmla="*/ 0 w 330200"/>
-              <a:gd name="connsiteY0" fmla="*/ 0 h 660400"/>
-              <a:gd name="connsiteX1" fmla="*/ 330200 w 330200"/>
-              <a:gd name="connsiteY1" fmla="*/ 330200 h 660400"/>
-              <a:gd name="connsiteX2" fmla="*/ 0 w 330200"/>
-              <a:gd name="connsiteY2" fmla="*/ 660400 h 660400"/>
-              <a:gd name="connsiteX3" fmla="*/ 0 w 330200"/>
-              <a:gd name="connsiteY3" fmla="*/ 0 h 660400"/>
-            </a:gdLst>
-            <a:ahLst/>
-            <a:cxnLst>
-              <a:cxn ang="0">
-                <a:pos x="connsiteX0" y="connsiteY0"/>
-              </a:cxn>
-              <a:cxn ang="0">
-                <a:pos x="connsiteX1" y="connsiteY1"/>
-              </a:cxn>
-              <a:cxn ang="0">
-                <a:pos x="connsiteX2" y="connsiteY2"/>
-              </a:cxn>
-              <a:cxn ang="0">
-                <a:pos x="connsiteX3" y="connsiteY3"/>
-              </a:cxn>
-            </a:cxnLst>
-            <a:rect l="l" t="t" r="r" b="b"/>
-            <a:pathLst>
-              <a:path w="330200" h="660400">
-                <a:moveTo>
-                  <a:pt x="0" y="0"/>
-                </a:moveTo>
-                <a:cubicBezTo>
-                  <a:pt x="182364" y="0"/>
-                  <a:pt x="330200" y="147836"/>
-                  <a:pt x="330200" y="330200"/>
-                </a:cubicBezTo>
-                <a:cubicBezTo>
-                  <a:pt x="330200" y="512564"/>
-                  <a:pt x="182364" y="660400"/>
-                  <a:pt x="0" y="660400"/>
-                </a:cubicBezTo>
-                <a:lnTo>
-                  <a:pt x="0" y="0"/>
-                </a:lnTo>
-                <a:close/>
-              </a:path>
-            </a:pathLst>
-          </a:custGeom>
-          <a:solidFill>
-            <a:srgbClr val="F3103A"/>
-          </a:solidFill>
-          <a:ln>
-            <a:noFill/>
-          </a:ln>
-        </p:spPr>
-        <p:style>
-          <a:lnRef idx="0">
-            <a:scrgbClr r="0" g="0" b="0"/>
-          </a:lnRef>
-          <a:fillRef idx="0">
-            <a:scrgbClr r="0" g="0" b="0"/>
-          </a:fillRef>
-          <a:effectRef idx="0">
-            <a:scrgbClr r="0" g="0" b="0"/>
-          </a:effectRef>
-          <a:fontRef idx="minor">
-            <a:schemeClr val="lt1"/>
-          </a:fontRef>
-        </p:style>
-        <p:txBody>
-          <a:bodyPr wrap="square" rtlCol="0" anchor="ctr">
-            <a:noAutofit/>
-          </a:bodyPr>
-          <a:lstStyle/>
-          <a:p>
-            <a:pPr algn="ctr"/>
-            <a:endParaRPr lang="fr-FR"/>
-          </a:p>
-        </p:txBody>
-      </p:sp>
       <p:pic>
         <p:nvPicPr>
           <p:cNvPr id="16" name="Image 15">
@@ -19404,105 +15595,6 @@
           </a:p>
         </p:txBody>
       </p:sp>
-      <p:sp>
-        <p:nvSpPr>
-          <p:cNvPr id="48" name="Forme libre 47">
-            <a:extLst>
-              <a:ext uri="{FF2B5EF4-FFF2-40B4-BE49-F238E27FC236}">
-                <a16:creationId xmlns:a16="http://schemas.microsoft.com/office/drawing/2014/main" id="{BFE91202-F831-B711-2979-3BEDBBFB59C4}"/>
-              </a:ext>
-            </a:extLst>
-          </p:cNvPr>
-          <p:cNvSpPr/>
-          <p:nvPr/>
-        </p:nvSpPr>
-        <p:spPr>
-          <a:xfrm>
-            <a:off x="0" y="6346586"/>
-            <a:ext cx="330200" cy="660400"/>
-          </a:xfrm>
-          <a:custGeom>
-            <a:avLst/>
-            <a:gdLst>
-              <a:gd name="connsiteX0" fmla="*/ 0 w 330200"/>
-              <a:gd name="connsiteY0" fmla="*/ 0 h 660400"/>
-              <a:gd name="connsiteX1" fmla="*/ 330200 w 330200"/>
-              <a:gd name="connsiteY1" fmla="*/ 330200 h 660400"/>
-              <a:gd name="connsiteX2" fmla="*/ 0 w 330200"/>
-              <a:gd name="connsiteY2" fmla="*/ 660400 h 660400"/>
-              <a:gd name="connsiteX3" fmla="*/ 0 w 330200"/>
-              <a:gd name="connsiteY3" fmla="*/ 0 h 660400"/>
-            </a:gdLst>
-            <a:ahLst/>
-            <a:cxnLst>
-              <a:cxn ang="0">
-                <a:pos x="connsiteX0" y="connsiteY0"/>
-              </a:cxn>
-              <a:cxn ang="0">
-                <a:pos x="connsiteX1" y="connsiteY1"/>
-              </a:cxn>
-              <a:cxn ang="0">
-                <a:pos x="connsiteX2" y="connsiteY2"/>
-              </a:cxn>
-              <a:cxn ang="0">
-                <a:pos x="connsiteX3" y="connsiteY3"/>
-              </a:cxn>
-            </a:cxnLst>
-            <a:rect l="l" t="t" r="r" b="b"/>
-            <a:pathLst>
-              <a:path w="330200" h="660400">
-                <a:moveTo>
-                  <a:pt x="0" y="0"/>
-                </a:moveTo>
-                <a:cubicBezTo>
-                  <a:pt x="182364" y="0"/>
-                  <a:pt x="330200" y="147836"/>
-                  <a:pt x="330200" y="330200"/>
-                </a:cubicBezTo>
-                <a:cubicBezTo>
-                  <a:pt x="330200" y="512564"/>
-                  <a:pt x="182364" y="660400"/>
-                  <a:pt x="0" y="660400"/>
-                </a:cubicBezTo>
-                <a:lnTo>
-                  <a:pt x="0" y="0"/>
-                </a:lnTo>
-                <a:close/>
-              </a:path>
-            </a:pathLst>
-          </a:custGeom>
-          <a:solidFill>
-            <a:srgbClr val="F3103A"/>
-          </a:solidFill>
-          <a:ln>
-            <a:noFill/>
-          </a:ln>
-        </p:spPr>
-        <p:style>
-          <a:lnRef idx="0">
-            <a:scrgbClr r="0" g="0" b="0"/>
-          </a:lnRef>
-          <a:fillRef idx="0">
-            <a:scrgbClr r="0" g="0" b="0"/>
-          </a:fillRef>
-          <a:effectRef idx="0">
-            <a:scrgbClr r="0" g="0" b="0"/>
-          </a:effectRef>
-          <a:fontRef idx="minor">
-            <a:schemeClr val="lt1"/>
-          </a:fontRef>
-        </p:style>
-        <p:txBody>
-          <a:bodyPr wrap="square" rtlCol="0" anchor="ctr">
-            <a:noAutofit/>
-          </a:bodyPr>
-          <a:lstStyle/>
-          <a:p>
-            <a:pPr algn="ctr"/>
-            <a:endParaRPr lang="fr-FR"/>
-          </a:p>
-        </p:txBody>
-      </p:sp>
       <p:pic>
         <p:nvPicPr>
           <p:cNvPr id="16" name="Image 15">
@@ -20335,105 +16427,6 @@
           </a:p>
         </p:txBody>
       </p:sp>
-      <p:sp>
-        <p:nvSpPr>
-          <p:cNvPr id="48" name="Forme libre 47">
-            <a:extLst>
-              <a:ext uri="{FF2B5EF4-FFF2-40B4-BE49-F238E27FC236}">
-                <a16:creationId xmlns:a16="http://schemas.microsoft.com/office/drawing/2014/main" id="{49845E24-64A8-94F7-1AD8-5E120D109EC7}"/>
-              </a:ext>
-            </a:extLst>
-          </p:cNvPr>
-          <p:cNvSpPr/>
-          <p:nvPr/>
-        </p:nvSpPr>
-        <p:spPr>
-          <a:xfrm>
-            <a:off x="0" y="6346586"/>
-            <a:ext cx="330200" cy="660400"/>
-          </a:xfrm>
-          <a:custGeom>
-            <a:avLst/>
-            <a:gdLst>
-              <a:gd name="connsiteX0" fmla="*/ 0 w 330200"/>
-              <a:gd name="connsiteY0" fmla="*/ 0 h 660400"/>
-              <a:gd name="connsiteX1" fmla="*/ 330200 w 330200"/>
-              <a:gd name="connsiteY1" fmla="*/ 330200 h 660400"/>
-              <a:gd name="connsiteX2" fmla="*/ 0 w 330200"/>
-              <a:gd name="connsiteY2" fmla="*/ 660400 h 660400"/>
-              <a:gd name="connsiteX3" fmla="*/ 0 w 330200"/>
-              <a:gd name="connsiteY3" fmla="*/ 0 h 660400"/>
-            </a:gdLst>
-            <a:ahLst/>
-            <a:cxnLst>
-              <a:cxn ang="0">
-                <a:pos x="connsiteX0" y="connsiteY0"/>
-              </a:cxn>
-              <a:cxn ang="0">
-                <a:pos x="connsiteX1" y="connsiteY1"/>
-              </a:cxn>
-              <a:cxn ang="0">
-                <a:pos x="connsiteX2" y="connsiteY2"/>
-              </a:cxn>
-              <a:cxn ang="0">
-                <a:pos x="connsiteX3" y="connsiteY3"/>
-              </a:cxn>
-            </a:cxnLst>
-            <a:rect l="l" t="t" r="r" b="b"/>
-            <a:pathLst>
-              <a:path w="330200" h="660400">
-                <a:moveTo>
-                  <a:pt x="0" y="0"/>
-                </a:moveTo>
-                <a:cubicBezTo>
-                  <a:pt x="182364" y="0"/>
-                  <a:pt x="330200" y="147836"/>
-                  <a:pt x="330200" y="330200"/>
-                </a:cubicBezTo>
-                <a:cubicBezTo>
-                  <a:pt x="330200" y="512564"/>
-                  <a:pt x="182364" y="660400"/>
-                  <a:pt x="0" y="660400"/>
-                </a:cubicBezTo>
-                <a:lnTo>
-                  <a:pt x="0" y="0"/>
-                </a:lnTo>
-                <a:close/>
-              </a:path>
-            </a:pathLst>
-          </a:custGeom>
-          <a:solidFill>
-            <a:srgbClr val="F3103A"/>
-          </a:solidFill>
-          <a:ln>
-            <a:noFill/>
-          </a:ln>
-        </p:spPr>
-        <p:style>
-          <a:lnRef idx="0">
-            <a:scrgbClr r="0" g="0" b="0"/>
-          </a:lnRef>
-          <a:fillRef idx="0">
-            <a:scrgbClr r="0" g="0" b="0"/>
-          </a:fillRef>
-          <a:effectRef idx="0">
-            <a:scrgbClr r="0" g="0" b="0"/>
-          </a:effectRef>
-          <a:fontRef idx="minor">
-            <a:schemeClr val="lt1"/>
-          </a:fontRef>
-        </p:style>
-        <p:txBody>
-          <a:bodyPr wrap="square" rtlCol="0" anchor="ctr">
-            <a:noAutofit/>
-          </a:bodyPr>
-          <a:lstStyle/>
-          <a:p>
-            <a:pPr algn="ctr"/>
-            <a:endParaRPr lang="fr-FR"/>
-          </a:p>
-        </p:txBody>
-      </p:sp>
       <p:pic>
         <p:nvPicPr>
           <p:cNvPr id="16" name="Image 15">
@@ -21343,105 +17336,6 @@
           </a:custGeom>
           <a:solidFill>
             <a:srgbClr val="FA3EE0"/>
-          </a:solidFill>
-          <a:ln>
-            <a:noFill/>
-          </a:ln>
-        </p:spPr>
-        <p:style>
-          <a:lnRef idx="0">
-            <a:scrgbClr r="0" g="0" b="0"/>
-          </a:lnRef>
-          <a:fillRef idx="0">
-            <a:scrgbClr r="0" g="0" b="0"/>
-          </a:fillRef>
-          <a:effectRef idx="0">
-            <a:scrgbClr r="0" g="0" b="0"/>
-          </a:effectRef>
-          <a:fontRef idx="minor">
-            <a:schemeClr val="lt1"/>
-          </a:fontRef>
-        </p:style>
-        <p:txBody>
-          <a:bodyPr wrap="square" rtlCol="0" anchor="ctr">
-            <a:noAutofit/>
-          </a:bodyPr>
-          <a:lstStyle/>
-          <a:p>
-            <a:pPr algn="ctr"/>
-            <a:endParaRPr lang="fr-FR"/>
-          </a:p>
-        </p:txBody>
-      </p:sp>
-      <p:sp>
-        <p:nvSpPr>
-          <p:cNvPr id="48" name="Forme libre 47">
-            <a:extLst>
-              <a:ext uri="{FF2B5EF4-FFF2-40B4-BE49-F238E27FC236}">
-                <a16:creationId xmlns:a16="http://schemas.microsoft.com/office/drawing/2014/main" id="{C44FF99D-A38D-15BE-1C2E-AE446A69C598}"/>
-              </a:ext>
-            </a:extLst>
-          </p:cNvPr>
-          <p:cNvSpPr/>
-          <p:nvPr/>
-        </p:nvSpPr>
-        <p:spPr>
-          <a:xfrm>
-            <a:off x="0" y="6346586"/>
-            <a:ext cx="330200" cy="660400"/>
-          </a:xfrm>
-          <a:custGeom>
-            <a:avLst/>
-            <a:gdLst>
-              <a:gd name="connsiteX0" fmla="*/ 0 w 330200"/>
-              <a:gd name="connsiteY0" fmla="*/ 0 h 660400"/>
-              <a:gd name="connsiteX1" fmla="*/ 330200 w 330200"/>
-              <a:gd name="connsiteY1" fmla="*/ 330200 h 660400"/>
-              <a:gd name="connsiteX2" fmla="*/ 0 w 330200"/>
-              <a:gd name="connsiteY2" fmla="*/ 660400 h 660400"/>
-              <a:gd name="connsiteX3" fmla="*/ 0 w 330200"/>
-              <a:gd name="connsiteY3" fmla="*/ 0 h 660400"/>
-            </a:gdLst>
-            <a:ahLst/>
-            <a:cxnLst>
-              <a:cxn ang="0">
-                <a:pos x="connsiteX0" y="connsiteY0"/>
-              </a:cxn>
-              <a:cxn ang="0">
-                <a:pos x="connsiteX1" y="connsiteY1"/>
-              </a:cxn>
-              <a:cxn ang="0">
-                <a:pos x="connsiteX2" y="connsiteY2"/>
-              </a:cxn>
-              <a:cxn ang="0">
-                <a:pos x="connsiteX3" y="connsiteY3"/>
-              </a:cxn>
-            </a:cxnLst>
-            <a:rect l="l" t="t" r="r" b="b"/>
-            <a:pathLst>
-              <a:path w="330200" h="660400">
-                <a:moveTo>
-                  <a:pt x="0" y="0"/>
-                </a:moveTo>
-                <a:cubicBezTo>
-                  <a:pt x="182364" y="0"/>
-                  <a:pt x="330200" y="147836"/>
-                  <a:pt x="330200" y="330200"/>
-                </a:cubicBezTo>
-                <a:cubicBezTo>
-                  <a:pt x="330200" y="512564"/>
-                  <a:pt x="182364" y="660400"/>
-                  <a:pt x="0" y="660400"/>
-                </a:cubicBezTo>
-                <a:lnTo>
-                  <a:pt x="0" y="0"/>
-                </a:lnTo>
-                <a:close/>
-              </a:path>
-            </a:pathLst>
-          </a:custGeom>
-          <a:solidFill>
-            <a:srgbClr val="F3103A"/>
           </a:solidFill>
           <a:ln>
             <a:noFill/>

</xml_diff>